<commit_message>
Finished naive, working on DFT
</commit_message>
<xml_diff>
--- a/poster.pptx
+++ b/poster.pptx
@@ -6,7 +6,6 @@
   </p:sldMasterIdLst>
   <p:sldIdLst>
     <p:sldId id="258" r:id="rId2"/>
-    <p:sldId id="259" r:id="rId3"/>
   </p:sldIdLst>
   <p:sldSz cx="32918400" cy="21945600"/>
   <p:notesSz cx="6858000" cy="9144000"/>
@@ -3596,7 +3595,7 @@
                 </a:solidFill>
                 <a:latin typeface="Source Sans Pro Regular"/>
               </a:rPr>
-              <a:t>Poster Title: Poster Subtitle</a:t>
+              <a:t>The Role of Processing Cough Audio to Detect Covid-19</a:t>
             </a:r>
           </a:p>
         </p:txBody>
@@ -3645,7 +3644,7 @@
         </p:nvSpPr>
         <p:spPr>
           <a:xfrm>
-            <a:off x="29827899" y="3413404"/>
+            <a:off x="29745887" y="3413404"/>
             <a:ext cx="3752491" cy="471989"/>
           </a:xfrm>
           <a:prstGeom prst="rect">
@@ -3666,7 +3665,7 @@
                 </a:solidFill>
                 <a:latin typeface="Source Sans Pro Regular"/>
               </a:rPr>
-              <a:t>Department Name</a:t>
+              <a:t>Electrical Engineering</a:t>
             </a:r>
           </a:p>
         </p:txBody>
@@ -3707,158 +3706,7 @@
                 </a:solidFill>
                 <a:latin typeface="Source Sans Pro Italic"/>
               </a:rPr>
-              <a:t>First1 Last1,</a:t>
-            </a:r>
-            <a:r>
-              <a:rPr lang="en-US" sz="4000" i="1" baseline="30000" dirty="0">
-                <a:solidFill>
-                  <a:schemeClr val="bg1"/>
-                </a:solidFill>
-                <a:latin typeface="Source Sans Pro Italic"/>
-              </a:rPr>
-              <a:t>1</a:t>
-            </a:r>
-            <a:r>
-              <a:rPr lang="en-US" sz="4000" i="1" dirty="0">
-                <a:solidFill>
-                  <a:schemeClr val="bg1"/>
-                </a:solidFill>
-                <a:latin typeface="Source Sans Pro Italic"/>
-              </a:rPr>
-              <a:t> First2 Last2,</a:t>
-            </a:r>
-            <a:r>
-              <a:rPr lang="en-US" sz="4000" i="1" baseline="30000" dirty="0">
-                <a:solidFill>
-                  <a:schemeClr val="bg1"/>
-                </a:solidFill>
-                <a:latin typeface="Source Sans Pro Italic"/>
-              </a:rPr>
-              <a:t>1</a:t>
-            </a:r>
-            <a:r>
-              <a:rPr lang="en-US" sz="4000" i="1" dirty="0">
-                <a:solidFill>
-                  <a:schemeClr val="bg1"/>
-                </a:solidFill>
-                <a:latin typeface="Source Sans Pro Italic"/>
-              </a:rPr>
-              <a:t> First3, Last3</a:t>
-            </a:r>
-            <a:r>
-              <a:rPr lang="en-US" sz="4000" i="1" baseline="30000" dirty="0">
-                <a:solidFill>
-                  <a:schemeClr val="bg1"/>
-                </a:solidFill>
-                <a:latin typeface="Source Sans Pro Italic"/>
-              </a:rPr>
-              <a:t>1,2</a:t>
-            </a:r>
-            <a:endParaRPr lang="en-US" sz="4000" i="1" dirty="0">
-              <a:solidFill>
-                <a:schemeClr val="bg1"/>
-              </a:solidFill>
-              <a:latin typeface="Source Sans Pro Italic"/>
-            </a:endParaRPr>
-          </a:p>
-        </p:txBody>
-      </p:sp>
-      <p:sp>
-        <p:nvSpPr>
-          <p:cNvPr id="38" name="TextBox 37">
-            <a:extLst>
-              <a:ext uri="{FF2B5EF4-FFF2-40B4-BE49-F238E27FC236}">
-                <a16:creationId xmlns:a16="http://schemas.microsoft.com/office/drawing/2014/main" id="{A62F6516-278F-9C49-A513-1A5BCF3A0D49}"/>
-              </a:ext>
-            </a:extLst>
-          </p:cNvPr>
-          <p:cNvSpPr txBox="1"/>
-          <p:nvPr/>
-        </p:nvSpPr>
-        <p:spPr>
-          <a:xfrm>
-            <a:off x="7685169" y="2357702"/>
-            <a:ext cx="21270830" cy="523220"/>
-          </a:xfrm>
-          <a:prstGeom prst="rect">
-            <a:avLst/>
-          </a:prstGeom>
-          <a:noFill/>
-        </p:spPr>
-        <p:txBody>
-          <a:bodyPr wrap="square" rtlCol="0">
-            <a:spAutoFit/>
-          </a:bodyPr>
-          <a:lstStyle/>
-          <a:p>
-            <a:pPr algn="ctr"/>
-            <a:r>
-              <a:rPr lang="en-US" sz="2800" i="1" baseline="30000" dirty="0">
-                <a:solidFill>
-                  <a:schemeClr val="bg1"/>
-                </a:solidFill>
-                <a:latin typeface="Source Sans Pro Italic"/>
-              </a:rPr>
-              <a:t>1</a:t>
-            </a:r>
-            <a:r>
-              <a:rPr lang="en-US" sz="2800" i="1" dirty="0">
-                <a:solidFill>
-                  <a:schemeClr val="bg1"/>
-                </a:solidFill>
-                <a:latin typeface="Source Sans Pro Italic"/>
-              </a:rPr>
-              <a:t>Example Lab, Department Name, Stanford University</a:t>
-            </a:r>
-          </a:p>
-        </p:txBody>
-      </p:sp>
-      <p:sp>
-        <p:nvSpPr>
-          <p:cNvPr id="39" name="TextBox 38">
-            <a:extLst>
-              <a:ext uri="{FF2B5EF4-FFF2-40B4-BE49-F238E27FC236}">
-                <a16:creationId xmlns:a16="http://schemas.microsoft.com/office/drawing/2014/main" id="{49741301-AFA9-8F45-BB67-4B379BDD3140}"/>
-              </a:ext>
-            </a:extLst>
-          </p:cNvPr>
-          <p:cNvSpPr txBox="1"/>
-          <p:nvPr/>
-        </p:nvSpPr>
-        <p:spPr>
-          <a:xfrm>
-            <a:off x="7685169" y="2762098"/>
-            <a:ext cx="21270830" cy="523220"/>
-          </a:xfrm>
-          <a:prstGeom prst="rect">
-            <a:avLst/>
-          </a:prstGeom>
-          <a:noFill/>
-        </p:spPr>
-        <p:txBody>
-          <a:bodyPr wrap="square" rtlCol="0">
-            <a:spAutoFit/>
-          </a:bodyPr>
-          <a:lstStyle/>
-          <a:p>
-            <a:pPr algn="ctr"/>
-            <a:r>
-              <a:rPr lang="en-US" sz="2800" i="1" baseline="30000" dirty="0">
-                <a:solidFill>
-                  <a:schemeClr val="bg1"/>
-                </a:solidFill>
-                <a:latin typeface="Source Sans Pro Italic"/>
-              </a:rPr>
-              <a:t>2</a:t>
-            </a:r>
-            <a:r>
-              <a:rPr lang="en-US" sz="2800" i="1" dirty="0">
-                <a:solidFill>
-                  <a:schemeClr val="bg1"/>
-                </a:solidFill>
-                <a:latin typeface="Source Sans Pro Italic"/>
-              </a:rPr>
-              <a:t>Example Lab, Department Name2, Other University</a:t>
+              <a:t>Stephen Zhu, srzhu3@stanford.edu</a:t>
             </a:r>
           </a:p>
         </p:txBody>
@@ -4573,15 +4421,7 @@
             </a:r>
             <a:r>
               <a:rPr lang="en-US" sz="2400" dirty="0"/>
-              <a:t>. </a:t>
-            </a:r>
-            <a:r>
-              <a:rPr lang="en-US" sz="2400" dirty="0" err="1"/>
-              <a:t>Sed</a:t>
-            </a:r>
-            <a:r>
-              <a:rPr lang="en-US" sz="2400" dirty="0"/>
-              <a:t> </a:t>
+              <a:t>. Sed </a:t>
             </a:r>
             <a:r>
               <a:rPr lang="en-US" sz="2400" dirty="0" err="1"/>
@@ -5511,1178 +5351,6 @@
     <p:extLst>
       <p:ext uri="{BB962C8B-B14F-4D97-AF65-F5344CB8AC3E}">
         <p14:creationId xmlns:p14="http://schemas.microsoft.com/office/powerpoint/2010/main" val="1386278785"/>
-      </p:ext>
-    </p:extLst>
-  </p:cSld>
-  <p:clrMapOvr>
-    <a:masterClrMapping/>
-  </p:clrMapOvr>
-</p:sld>
-</file>
-
-<file path=ppt/slides/slide2.xml><?xml version="1.0" encoding="utf-8"?>
-<p:sld xmlns:a="http://schemas.openxmlformats.org/drawingml/2006/main" xmlns:r="http://schemas.openxmlformats.org/officeDocument/2006/relationships" xmlns:p="http://schemas.openxmlformats.org/presentationml/2006/main">
-  <p:cSld>
-    <p:spTree>
-      <p:nvGrpSpPr>
-        <p:cNvPr id="1" name=""/>
-        <p:cNvGrpSpPr/>
-        <p:nvPr/>
-      </p:nvGrpSpPr>
-      <p:grpSpPr>
-        <a:xfrm>
-          <a:off x="0" y="0"/>
-          <a:ext cx="0" cy="0"/>
-          <a:chOff x="0" y="0"/>
-          <a:chExt cx="0" cy="0"/>
-        </a:xfrm>
-      </p:grpSpPr>
-      <p:grpSp>
-        <p:nvGrpSpPr>
-          <p:cNvPr id="2" name="Group 1">
-            <a:extLst>
-              <a:ext uri="{FF2B5EF4-FFF2-40B4-BE49-F238E27FC236}">
-                <a16:creationId xmlns:a16="http://schemas.microsoft.com/office/drawing/2014/main" id="{EA83768E-62AC-8042-883A-DCEBBA604940}"/>
-              </a:ext>
-            </a:extLst>
-          </p:cNvPr>
-          <p:cNvGrpSpPr/>
-          <p:nvPr/>
-        </p:nvGrpSpPr>
-        <p:grpSpPr>
-          <a:xfrm>
-            <a:off x="0" y="0"/>
-            <a:ext cx="32932736" cy="4029235"/>
-            <a:chOff x="0" y="0"/>
-            <a:chExt cx="32932736" cy="4029235"/>
-          </a:xfrm>
-        </p:grpSpPr>
-        <p:sp>
-          <p:nvSpPr>
-            <p:cNvPr id="20" name="Rectangle 19">
-              <a:extLst>
-                <a:ext uri="{FF2B5EF4-FFF2-40B4-BE49-F238E27FC236}">
-                  <a16:creationId xmlns:a16="http://schemas.microsoft.com/office/drawing/2014/main" id="{95F77903-2A48-8D4E-8934-DF62F455D999}"/>
-                </a:ext>
-              </a:extLst>
-            </p:cNvPr>
-            <p:cNvSpPr/>
-            <p:nvPr/>
-          </p:nvSpPr>
-          <p:spPr>
-            <a:xfrm>
-              <a:off x="29605212" y="3504869"/>
-              <a:ext cx="3327523" cy="524366"/>
-            </a:xfrm>
-            <a:prstGeom prst="rect">
-              <a:avLst/>
-            </a:prstGeom>
-            <a:solidFill>
-              <a:srgbClr val="D2C295"/>
-            </a:solidFill>
-            <a:ln>
-              <a:solidFill>
-                <a:srgbClr val="D2C295"/>
-              </a:solidFill>
-            </a:ln>
-          </p:spPr>
-          <p:style>
-            <a:lnRef idx="2">
-              <a:schemeClr val="accent1">
-                <a:shade val="50000"/>
-              </a:schemeClr>
-            </a:lnRef>
-            <a:fillRef idx="1">
-              <a:schemeClr val="accent1"/>
-            </a:fillRef>
-            <a:effectRef idx="0">
-              <a:schemeClr val="accent1"/>
-            </a:effectRef>
-            <a:fontRef idx="minor">
-              <a:schemeClr val="lt1"/>
-            </a:fontRef>
-          </p:style>
-          <p:txBody>
-            <a:bodyPr rot="0" spcFirstLastPara="0" vertOverflow="overflow" horzOverflow="overflow" vert="horz" wrap="square" lIns="60960" tIns="30480" rIns="60960" bIns="30480" numCol="1" spcCol="0" rtlCol="0" fromWordArt="0" anchor="ctr" anchorCtr="0" forceAA="0" compatLnSpc="1">
-              <a:prstTxWarp prst="textNoShape">
-                <a:avLst/>
-              </a:prstTxWarp>
-              <a:noAutofit/>
-            </a:bodyPr>
-            <a:lstStyle/>
-            <a:p>
-              <a:pPr algn="ctr"/>
-              <a:endParaRPr lang="en-US" sz="3456" dirty="0">
-                <a:latin typeface="Crimson Roman"/>
-              </a:endParaRPr>
-            </a:p>
-          </p:txBody>
-        </p:sp>
-        <p:sp>
-          <p:nvSpPr>
-            <p:cNvPr id="4" name="Rectangle 3">
-              <a:extLst>
-                <a:ext uri="{FF2B5EF4-FFF2-40B4-BE49-F238E27FC236}">
-                  <a16:creationId xmlns:a16="http://schemas.microsoft.com/office/drawing/2014/main" id="{E13EDE96-696B-6940-8005-05A86EBF74DF}"/>
-                </a:ext>
-              </a:extLst>
-            </p:cNvPr>
-            <p:cNvSpPr/>
-            <p:nvPr/>
-          </p:nvSpPr>
-          <p:spPr>
-            <a:xfrm>
-              <a:off x="0" y="0"/>
-              <a:ext cx="32918400" cy="3546764"/>
-            </a:xfrm>
-            <a:prstGeom prst="rect">
-              <a:avLst/>
-            </a:prstGeom>
-            <a:solidFill>
-              <a:srgbClr val="8C1515"/>
-            </a:solidFill>
-            <a:ln>
-              <a:solidFill>
-                <a:srgbClr val="8C1515"/>
-              </a:solidFill>
-            </a:ln>
-          </p:spPr>
-          <p:style>
-            <a:lnRef idx="2">
-              <a:schemeClr val="accent1">
-                <a:shade val="50000"/>
-              </a:schemeClr>
-            </a:lnRef>
-            <a:fillRef idx="1">
-              <a:schemeClr val="accent1"/>
-            </a:fillRef>
-            <a:effectRef idx="0">
-              <a:schemeClr val="accent1"/>
-            </a:effectRef>
-            <a:fontRef idx="minor">
-              <a:schemeClr val="lt1"/>
-            </a:fontRef>
-          </p:style>
-          <p:txBody>
-            <a:bodyPr rot="0" spcFirstLastPara="0" vertOverflow="overflow" horzOverflow="overflow" vert="horz" wrap="square" lIns="60960" tIns="30480" rIns="60960" bIns="30480" numCol="1" spcCol="0" rtlCol="0" fromWordArt="0" anchor="ctr" anchorCtr="0" forceAA="0" compatLnSpc="1">
-              <a:prstTxWarp prst="textNoShape">
-                <a:avLst/>
-              </a:prstTxWarp>
-              <a:noAutofit/>
-            </a:bodyPr>
-            <a:lstStyle/>
-            <a:p>
-              <a:pPr algn="ctr"/>
-              <a:endParaRPr lang="en-US" sz="3456" dirty="0">
-                <a:latin typeface="Source Sans Pro Regular"/>
-              </a:endParaRPr>
-            </a:p>
-          </p:txBody>
-        </p:sp>
-        <p:pic>
-          <p:nvPicPr>
-            <p:cNvPr id="6" name="Picture 5">
-              <a:extLst>
-                <a:ext uri="{FF2B5EF4-FFF2-40B4-BE49-F238E27FC236}">
-                  <a16:creationId xmlns:a16="http://schemas.microsoft.com/office/drawing/2014/main" id="{27BCE93A-187E-B343-BE0A-8DD846761F9A}"/>
-                </a:ext>
-              </a:extLst>
-            </p:cNvPr>
-            <p:cNvPicPr>
-              <a:picLocks noChangeAspect="1"/>
-            </p:cNvPicPr>
-            <p:nvPr/>
-          </p:nvPicPr>
-          <p:blipFill>
-            <a:blip r:embed="rId2"/>
-            <a:stretch>
-              <a:fillRect/>
-            </a:stretch>
-          </p:blipFill>
-          <p:spPr>
-            <a:xfrm>
-              <a:off x="457412" y="283854"/>
-              <a:ext cx="2979057" cy="2979057"/>
-            </a:xfrm>
-            <a:prstGeom prst="rect">
-              <a:avLst/>
-            </a:prstGeom>
-          </p:spPr>
-        </p:pic>
-        <p:sp>
-          <p:nvSpPr>
-            <p:cNvPr id="7" name="Rectangle 6">
-              <a:extLst>
-                <a:ext uri="{FF2B5EF4-FFF2-40B4-BE49-F238E27FC236}">
-                  <a16:creationId xmlns:a16="http://schemas.microsoft.com/office/drawing/2014/main" id="{6C9FFE2E-2CCF-D245-A379-D37BD4B4B164}"/>
-                </a:ext>
-              </a:extLst>
-            </p:cNvPr>
-            <p:cNvSpPr/>
-            <p:nvPr/>
-          </p:nvSpPr>
-          <p:spPr>
-            <a:xfrm>
-              <a:off x="3436469" y="3439189"/>
-              <a:ext cx="29496267" cy="220850"/>
-            </a:xfrm>
-            <a:prstGeom prst="rect">
-              <a:avLst/>
-            </a:prstGeom>
-            <a:solidFill>
-              <a:srgbClr val="D2C295"/>
-            </a:solidFill>
-            <a:ln>
-              <a:solidFill>
-                <a:srgbClr val="D2C295"/>
-              </a:solidFill>
-            </a:ln>
-          </p:spPr>
-          <p:style>
-            <a:lnRef idx="2">
-              <a:schemeClr val="accent1">
-                <a:shade val="50000"/>
-              </a:schemeClr>
-            </a:lnRef>
-            <a:fillRef idx="1">
-              <a:schemeClr val="accent1"/>
-            </a:fillRef>
-            <a:effectRef idx="0">
-              <a:schemeClr val="accent1"/>
-            </a:effectRef>
-            <a:fontRef idx="minor">
-              <a:schemeClr val="lt1"/>
-            </a:fontRef>
-          </p:style>
-          <p:txBody>
-            <a:bodyPr rot="0" spcFirstLastPara="0" vertOverflow="overflow" horzOverflow="overflow" vert="horz" wrap="square" lIns="60960" tIns="30480" rIns="60960" bIns="30480" numCol="1" spcCol="0" rtlCol="0" fromWordArt="0" anchor="ctr" anchorCtr="0" forceAA="0" compatLnSpc="1">
-              <a:prstTxWarp prst="textNoShape">
-                <a:avLst/>
-              </a:prstTxWarp>
-              <a:noAutofit/>
-            </a:bodyPr>
-            <a:lstStyle/>
-            <a:p>
-              <a:pPr algn="ctr"/>
-              <a:endParaRPr lang="en-US" sz="3456" dirty="0">
-                <a:latin typeface="Source Sans Pro Regular"/>
-              </a:endParaRPr>
-            </a:p>
-          </p:txBody>
-        </p:sp>
-        <p:sp>
-          <p:nvSpPr>
-            <p:cNvPr id="21" name="Right Triangle 20">
-              <a:extLst>
-                <a:ext uri="{FF2B5EF4-FFF2-40B4-BE49-F238E27FC236}">
-                  <a16:creationId xmlns:a16="http://schemas.microsoft.com/office/drawing/2014/main" id="{5D381EAB-DAA8-7143-8C05-0E75D5DAEDF0}"/>
-                </a:ext>
-              </a:extLst>
-            </p:cNvPr>
-            <p:cNvSpPr/>
-            <p:nvPr/>
-          </p:nvSpPr>
-          <p:spPr>
-            <a:xfrm rot="10800000">
-              <a:off x="28935002" y="3554978"/>
-              <a:ext cx="670209" cy="474257"/>
-            </a:xfrm>
-            <a:prstGeom prst="rtTriangle">
-              <a:avLst/>
-            </a:prstGeom>
-            <a:solidFill>
-              <a:srgbClr val="D2C295"/>
-            </a:solidFill>
-            <a:ln>
-              <a:solidFill>
-                <a:srgbClr val="D2C295"/>
-              </a:solidFill>
-            </a:ln>
-          </p:spPr>
-          <p:style>
-            <a:lnRef idx="2">
-              <a:schemeClr val="accent1">
-                <a:shade val="50000"/>
-              </a:schemeClr>
-            </a:lnRef>
-            <a:fillRef idx="1">
-              <a:schemeClr val="accent1"/>
-            </a:fillRef>
-            <a:effectRef idx="0">
-              <a:schemeClr val="accent1"/>
-            </a:effectRef>
-            <a:fontRef idx="minor">
-              <a:schemeClr val="lt1"/>
-            </a:fontRef>
-          </p:style>
-          <p:txBody>
-            <a:bodyPr rot="0" spcFirstLastPara="0" vertOverflow="overflow" horzOverflow="overflow" vert="horz" wrap="square" lIns="60960" tIns="30480" rIns="60960" bIns="30480" numCol="1" spcCol="0" rtlCol="0" fromWordArt="0" anchor="ctr" anchorCtr="0" forceAA="0" compatLnSpc="1">
-              <a:prstTxWarp prst="textNoShape">
-                <a:avLst/>
-              </a:prstTxWarp>
-              <a:noAutofit/>
-            </a:bodyPr>
-            <a:lstStyle/>
-            <a:p>
-              <a:pPr algn="ctr"/>
-              <a:endParaRPr lang="en-US" sz="3456" dirty="0">
-                <a:latin typeface="Crimson Roman"/>
-              </a:endParaRPr>
-            </a:p>
-          </p:txBody>
-        </p:sp>
-        <p:sp>
-          <p:nvSpPr>
-            <p:cNvPr id="23" name="Rectangle 22">
-              <a:extLst>
-                <a:ext uri="{FF2B5EF4-FFF2-40B4-BE49-F238E27FC236}">
-                  <a16:creationId xmlns:a16="http://schemas.microsoft.com/office/drawing/2014/main" id="{6CAEEF71-545E-9340-B1EC-95922F8011E4}"/>
-                </a:ext>
-              </a:extLst>
-            </p:cNvPr>
-            <p:cNvSpPr/>
-            <p:nvPr/>
-          </p:nvSpPr>
-          <p:spPr>
-            <a:xfrm>
-              <a:off x="29745888" y="2979414"/>
-              <a:ext cx="3022723" cy="904554"/>
-            </a:xfrm>
-            <a:prstGeom prst="rect">
-              <a:avLst/>
-            </a:prstGeom>
-            <a:solidFill>
-              <a:schemeClr val="bg1"/>
-            </a:solidFill>
-            <a:ln>
-              <a:solidFill>
-                <a:schemeClr val="bg1"/>
-              </a:solidFill>
-            </a:ln>
-          </p:spPr>
-          <p:style>
-            <a:lnRef idx="2">
-              <a:schemeClr val="accent1">
-                <a:shade val="50000"/>
-              </a:schemeClr>
-            </a:lnRef>
-            <a:fillRef idx="1">
-              <a:schemeClr val="accent1"/>
-            </a:fillRef>
-            <a:effectRef idx="0">
-              <a:schemeClr val="accent1"/>
-            </a:effectRef>
-            <a:fontRef idx="minor">
-              <a:schemeClr val="lt1"/>
-            </a:fontRef>
-          </p:style>
-          <p:txBody>
-            <a:bodyPr rot="0" spcFirstLastPara="0" vertOverflow="overflow" horzOverflow="overflow" vert="horz" wrap="square" lIns="60960" tIns="30480" rIns="60960" bIns="30480" numCol="1" spcCol="0" rtlCol="0" fromWordArt="0" anchor="ctr" anchorCtr="0" forceAA="0" compatLnSpc="1">
-              <a:prstTxWarp prst="textNoShape">
-                <a:avLst/>
-              </a:prstTxWarp>
-              <a:noAutofit/>
-            </a:bodyPr>
-            <a:lstStyle/>
-            <a:p>
-              <a:pPr algn="ctr"/>
-              <a:endParaRPr lang="en-US" sz="3456" dirty="0">
-                <a:solidFill>
-                  <a:srgbClr val="8C1515"/>
-                </a:solidFill>
-                <a:latin typeface="Crimson Roman"/>
-              </a:endParaRPr>
-            </a:p>
-          </p:txBody>
-        </p:sp>
-      </p:grpSp>
-      <p:sp>
-        <p:nvSpPr>
-          <p:cNvPr id="11" name="TextBox 10">
-            <a:extLst>
-              <a:ext uri="{FF2B5EF4-FFF2-40B4-BE49-F238E27FC236}">
-                <a16:creationId xmlns:a16="http://schemas.microsoft.com/office/drawing/2014/main" id="{2F80E265-3791-4345-A501-7B4BF1893D75}"/>
-              </a:ext>
-            </a:extLst>
-          </p:cNvPr>
-          <p:cNvSpPr txBox="1"/>
-          <p:nvPr/>
-        </p:nvSpPr>
-        <p:spPr>
-          <a:xfrm>
-            <a:off x="7685170" y="597483"/>
-            <a:ext cx="21270830" cy="1015663"/>
-          </a:xfrm>
-          <a:prstGeom prst="rect">
-            <a:avLst/>
-          </a:prstGeom>
-          <a:noFill/>
-        </p:spPr>
-        <p:txBody>
-          <a:bodyPr wrap="square" rtlCol="0">
-            <a:spAutoFit/>
-          </a:bodyPr>
-          <a:lstStyle/>
-          <a:p>
-            <a:pPr algn="ctr"/>
-            <a:r>
-              <a:rPr lang="en-US" sz="6000" dirty="0">
-                <a:solidFill>
-                  <a:schemeClr val="bg1"/>
-                </a:solidFill>
-                <a:latin typeface="Source Sans Pro Regular"/>
-              </a:rPr>
-              <a:t>Poster Title: Poster Subtitle</a:t>
-            </a:r>
-          </a:p>
-        </p:txBody>
-      </p:sp>
-      <p:pic>
-        <p:nvPicPr>
-          <p:cNvPr id="29" name="Picture 28">
-            <a:extLst>
-              <a:ext uri="{FF2B5EF4-FFF2-40B4-BE49-F238E27FC236}">
-                <a16:creationId xmlns:a16="http://schemas.microsoft.com/office/drawing/2014/main" id="{B19BC31B-934D-3C4C-92EA-65DAC8D4002F}"/>
-              </a:ext>
-            </a:extLst>
-          </p:cNvPr>
-          <p:cNvPicPr>
-            <a:picLocks noChangeAspect="1"/>
-          </p:cNvPicPr>
-          <p:nvPr/>
-        </p:nvPicPr>
-        <p:blipFill>
-          <a:blip r:embed="rId3"/>
-          <a:stretch>
-            <a:fillRect/>
-          </a:stretch>
-        </p:blipFill>
-        <p:spPr>
-          <a:xfrm>
-            <a:off x="29605212" y="2562532"/>
-            <a:ext cx="1982155" cy="1321437"/>
-          </a:xfrm>
-          <a:prstGeom prst="rect">
-            <a:avLst/>
-          </a:prstGeom>
-        </p:spPr>
-      </p:pic>
-      <p:sp>
-        <p:nvSpPr>
-          <p:cNvPr id="30" name="TextBox 29">
-            <a:extLst>
-              <a:ext uri="{FF2B5EF4-FFF2-40B4-BE49-F238E27FC236}">
-                <a16:creationId xmlns:a16="http://schemas.microsoft.com/office/drawing/2014/main" id="{BD540356-4E6F-C942-B0D3-E8EF1A743056}"/>
-              </a:ext>
-            </a:extLst>
-          </p:cNvPr>
-          <p:cNvSpPr txBox="1"/>
-          <p:nvPr/>
-        </p:nvSpPr>
-        <p:spPr>
-          <a:xfrm>
-            <a:off x="29827899" y="3413404"/>
-            <a:ext cx="3752491" cy="471989"/>
-          </a:xfrm>
-          <a:prstGeom prst="rect">
-            <a:avLst/>
-          </a:prstGeom>
-          <a:noFill/>
-        </p:spPr>
-        <p:txBody>
-          <a:bodyPr wrap="square" rtlCol="0">
-            <a:spAutoFit/>
-          </a:bodyPr>
-          <a:lstStyle/>
-          <a:p>
-            <a:r>
-              <a:rPr lang="en-US" sz="2467" dirty="0">
-                <a:solidFill>
-                  <a:srgbClr val="2E2D29"/>
-                </a:solidFill>
-                <a:latin typeface="Source Sans Pro Regular"/>
-              </a:rPr>
-              <a:t>Department Name</a:t>
-            </a:r>
-          </a:p>
-        </p:txBody>
-      </p:sp>
-      <p:sp>
-        <p:nvSpPr>
-          <p:cNvPr id="35" name="TextBox 34">
-            <a:extLst>
-              <a:ext uri="{FF2B5EF4-FFF2-40B4-BE49-F238E27FC236}">
-                <a16:creationId xmlns:a16="http://schemas.microsoft.com/office/drawing/2014/main" id="{79751C98-07D4-9E4F-B8EA-2EC69A53E599}"/>
-              </a:ext>
-            </a:extLst>
-          </p:cNvPr>
-          <p:cNvSpPr txBox="1"/>
-          <p:nvPr/>
-        </p:nvSpPr>
-        <p:spPr>
-          <a:xfrm>
-            <a:off x="7575442" y="1551479"/>
-            <a:ext cx="21270830" cy="707886"/>
-          </a:xfrm>
-          <a:prstGeom prst="rect">
-            <a:avLst/>
-          </a:prstGeom>
-          <a:noFill/>
-        </p:spPr>
-        <p:txBody>
-          <a:bodyPr wrap="square" rtlCol="0">
-            <a:spAutoFit/>
-          </a:bodyPr>
-          <a:lstStyle/>
-          <a:p>
-            <a:pPr algn="ctr"/>
-            <a:r>
-              <a:rPr lang="en-US" sz="4000" i="1" dirty="0">
-                <a:solidFill>
-                  <a:schemeClr val="bg1"/>
-                </a:solidFill>
-                <a:latin typeface="Source Sans Pro Italic"/>
-              </a:rPr>
-              <a:t>First1 Last1,</a:t>
-            </a:r>
-            <a:r>
-              <a:rPr lang="en-US" sz="4000" i="1" baseline="30000" dirty="0">
-                <a:solidFill>
-                  <a:schemeClr val="bg1"/>
-                </a:solidFill>
-                <a:latin typeface="Source Sans Pro Italic"/>
-              </a:rPr>
-              <a:t>1</a:t>
-            </a:r>
-            <a:r>
-              <a:rPr lang="en-US" sz="4000" i="1" dirty="0">
-                <a:solidFill>
-                  <a:schemeClr val="bg1"/>
-                </a:solidFill>
-                <a:latin typeface="Source Sans Pro Italic"/>
-              </a:rPr>
-              <a:t> First2 Last2,</a:t>
-            </a:r>
-            <a:r>
-              <a:rPr lang="en-US" sz="4000" i="1" baseline="30000" dirty="0">
-                <a:solidFill>
-                  <a:schemeClr val="bg1"/>
-                </a:solidFill>
-                <a:latin typeface="Source Sans Pro Italic"/>
-              </a:rPr>
-              <a:t>1</a:t>
-            </a:r>
-            <a:r>
-              <a:rPr lang="en-US" sz="4000" i="1" dirty="0">
-                <a:solidFill>
-                  <a:schemeClr val="bg1"/>
-                </a:solidFill>
-                <a:latin typeface="Source Sans Pro Italic"/>
-              </a:rPr>
-              <a:t> First3, Last3</a:t>
-            </a:r>
-            <a:r>
-              <a:rPr lang="en-US" sz="4000" i="1" baseline="30000" dirty="0">
-                <a:solidFill>
-                  <a:schemeClr val="bg1"/>
-                </a:solidFill>
-                <a:latin typeface="Source Sans Pro Italic"/>
-              </a:rPr>
-              <a:t>1,2</a:t>
-            </a:r>
-            <a:endParaRPr lang="en-US" sz="4000" i="1" dirty="0">
-              <a:solidFill>
-                <a:schemeClr val="bg1"/>
-              </a:solidFill>
-              <a:latin typeface="Source Sans Pro Italic"/>
-            </a:endParaRPr>
-          </a:p>
-        </p:txBody>
-      </p:sp>
-      <p:sp>
-        <p:nvSpPr>
-          <p:cNvPr id="38" name="TextBox 37">
-            <a:extLst>
-              <a:ext uri="{FF2B5EF4-FFF2-40B4-BE49-F238E27FC236}">
-                <a16:creationId xmlns:a16="http://schemas.microsoft.com/office/drawing/2014/main" id="{A62F6516-278F-9C49-A513-1A5BCF3A0D49}"/>
-              </a:ext>
-            </a:extLst>
-          </p:cNvPr>
-          <p:cNvSpPr txBox="1"/>
-          <p:nvPr/>
-        </p:nvSpPr>
-        <p:spPr>
-          <a:xfrm>
-            <a:off x="7685169" y="2357702"/>
-            <a:ext cx="21270830" cy="523220"/>
-          </a:xfrm>
-          <a:prstGeom prst="rect">
-            <a:avLst/>
-          </a:prstGeom>
-          <a:noFill/>
-        </p:spPr>
-        <p:txBody>
-          <a:bodyPr wrap="square" rtlCol="0">
-            <a:spAutoFit/>
-          </a:bodyPr>
-          <a:lstStyle/>
-          <a:p>
-            <a:pPr algn="ctr"/>
-            <a:r>
-              <a:rPr lang="en-US" sz="2800" i="1" baseline="30000" dirty="0">
-                <a:solidFill>
-                  <a:schemeClr val="bg1"/>
-                </a:solidFill>
-                <a:latin typeface="Source Sans Pro Italic"/>
-              </a:rPr>
-              <a:t>1</a:t>
-            </a:r>
-            <a:r>
-              <a:rPr lang="en-US" sz="2800" i="1" dirty="0">
-                <a:solidFill>
-                  <a:schemeClr val="bg1"/>
-                </a:solidFill>
-                <a:latin typeface="Source Sans Pro Italic"/>
-              </a:rPr>
-              <a:t>Example Lab, Department Name, Stanford University</a:t>
-            </a:r>
-          </a:p>
-        </p:txBody>
-      </p:sp>
-      <p:sp>
-        <p:nvSpPr>
-          <p:cNvPr id="39" name="TextBox 38">
-            <a:extLst>
-              <a:ext uri="{FF2B5EF4-FFF2-40B4-BE49-F238E27FC236}">
-                <a16:creationId xmlns:a16="http://schemas.microsoft.com/office/drawing/2014/main" id="{49741301-AFA9-8F45-BB67-4B379BDD3140}"/>
-              </a:ext>
-            </a:extLst>
-          </p:cNvPr>
-          <p:cNvSpPr txBox="1"/>
-          <p:nvPr/>
-        </p:nvSpPr>
-        <p:spPr>
-          <a:xfrm>
-            <a:off x="7685169" y="2762098"/>
-            <a:ext cx="21270830" cy="523220"/>
-          </a:xfrm>
-          <a:prstGeom prst="rect">
-            <a:avLst/>
-          </a:prstGeom>
-          <a:noFill/>
-        </p:spPr>
-        <p:txBody>
-          <a:bodyPr wrap="square" rtlCol="0">
-            <a:spAutoFit/>
-          </a:bodyPr>
-          <a:lstStyle/>
-          <a:p>
-            <a:pPr algn="ctr"/>
-            <a:r>
-              <a:rPr lang="en-US" sz="2800" i="1" baseline="30000" dirty="0">
-                <a:solidFill>
-                  <a:schemeClr val="bg1"/>
-                </a:solidFill>
-                <a:latin typeface="Source Sans Pro Italic"/>
-              </a:rPr>
-              <a:t>2</a:t>
-            </a:r>
-            <a:r>
-              <a:rPr lang="en-US" sz="2800" i="1" dirty="0">
-                <a:solidFill>
-                  <a:schemeClr val="bg1"/>
-                </a:solidFill>
-                <a:latin typeface="Source Sans Pro Italic"/>
-              </a:rPr>
-              <a:t>Example Lab, Department Name2, Other University</a:t>
-            </a:r>
-          </a:p>
-        </p:txBody>
-      </p:sp>
-      <p:grpSp>
-        <p:nvGrpSpPr>
-          <p:cNvPr id="43" name="Group 42">
-            <a:extLst>
-              <a:ext uri="{FF2B5EF4-FFF2-40B4-BE49-F238E27FC236}">
-                <a16:creationId xmlns:a16="http://schemas.microsoft.com/office/drawing/2014/main" id="{59E66EC5-27A1-F246-97E4-7334E77992EB}"/>
-              </a:ext>
-            </a:extLst>
-          </p:cNvPr>
-          <p:cNvGrpSpPr/>
-          <p:nvPr/>
-        </p:nvGrpSpPr>
-        <p:grpSpPr>
-          <a:xfrm>
-            <a:off x="220802" y="4119674"/>
-            <a:ext cx="7374264" cy="784322"/>
-            <a:chOff x="7655317" y="6043852"/>
-            <a:chExt cx="11061396" cy="1176482"/>
-          </a:xfrm>
-        </p:grpSpPr>
-        <p:sp>
-          <p:nvSpPr>
-            <p:cNvPr id="10" name="TextBox 9">
-              <a:extLst>
-                <a:ext uri="{FF2B5EF4-FFF2-40B4-BE49-F238E27FC236}">
-                  <a16:creationId xmlns:a16="http://schemas.microsoft.com/office/drawing/2014/main" id="{C2C6E47B-ACAE-754C-9334-40DA8E355574}"/>
-                </a:ext>
-              </a:extLst>
-            </p:cNvPr>
-            <p:cNvSpPr txBox="1"/>
-            <p:nvPr/>
-          </p:nvSpPr>
-          <p:spPr>
-            <a:xfrm>
-              <a:off x="7655317" y="6043852"/>
-              <a:ext cx="6047810" cy="969496"/>
-            </a:xfrm>
-            <a:prstGeom prst="rect">
-              <a:avLst/>
-            </a:prstGeom>
-            <a:noFill/>
-          </p:spPr>
-          <p:txBody>
-            <a:bodyPr wrap="none" rtlCol="0">
-              <a:spAutoFit/>
-            </a:bodyPr>
-            <a:lstStyle/>
-            <a:p>
-              <a:r>
-                <a:rPr lang="en-US" sz="3600" dirty="0">
-                  <a:solidFill>
-                    <a:srgbClr val="2E2D29"/>
-                  </a:solidFill>
-                  <a:latin typeface="Source Sans Pro Regular"/>
-                </a:rPr>
-                <a:t>Example Section 1</a:t>
-              </a:r>
-            </a:p>
-          </p:txBody>
-        </p:sp>
-        <p:sp>
-          <p:nvSpPr>
-            <p:cNvPr id="41" name="Rectangle 40">
-              <a:extLst>
-                <a:ext uri="{FF2B5EF4-FFF2-40B4-BE49-F238E27FC236}">
-                  <a16:creationId xmlns:a16="http://schemas.microsoft.com/office/drawing/2014/main" id="{836C4253-AF2A-0649-880D-4CF0DD13ED66}"/>
-                </a:ext>
-              </a:extLst>
-            </p:cNvPr>
-            <p:cNvSpPr/>
-            <p:nvPr/>
-          </p:nvSpPr>
-          <p:spPr>
-            <a:xfrm>
-              <a:off x="7743913" y="7174616"/>
-              <a:ext cx="10972800" cy="45718"/>
-            </a:xfrm>
-            <a:prstGeom prst="rect">
-              <a:avLst/>
-            </a:prstGeom>
-            <a:solidFill>
-              <a:srgbClr val="D2C295"/>
-            </a:solidFill>
-            <a:ln>
-              <a:solidFill>
-                <a:srgbClr val="D2C295"/>
-              </a:solidFill>
-            </a:ln>
-          </p:spPr>
-          <p:style>
-            <a:lnRef idx="2">
-              <a:schemeClr val="accent1">
-                <a:shade val="50000"/>
-              </a:schemeClr>
-            </a:lnRef>
-            <a:fillRef idx="1">
-              <a:schemeClr val="accent1"/>
-            </a:fillRef>
-            <a:effectRef idx="0">
-              <a:schemeClr val="accent1"/>
-            </a:effectRef>
-            <a:fontRef idx="minor">
-              <a:schemeClr val="lt1"/>
-            </a:fontRef>
-          </p:style>
-          <p:txBody>
-            <a:bodyPr rot="0" spcFirstLastPara="0" vertOverflow="overflow" horzOverflow="overflow" vert="horz" wrap="square" lIns="60960" tIns="30480" rIns="60960" bIns="30480" numCol="1" spcCol="0" rtlCol="0" fromWordArt="0" anchor="ctr" anchorCtr="0" forceAA="0" compatLnSpc="1">
-              <a:prstTxWarp prst="textNoShape">
-                <a:avLst/>
-              </a:prstTxWarp>
-              <a:noAutofit/>
-            </a:bodyPr>
-            <a:lstStyle/>
-            <a:p>
-              <a:pPr algn="ctr"/>
-              <a:endParaRPr lang="en-US" sz="3456"/>
-            </a:p>
-          </p:txBody>
-        </p:sp>
-      </p:grpSp>
-      <p:grpSp>
-        <p:nvGrpSpPr>
-          <p:cNvPr id="45" name="Group 44">
-            <a:extLst>
-              <a:ext uri="{FF2B5EF4-FFF2-40B4-BE49-F238E27FC236}">
-                <a16:creationId xmlns:a16="http://schemas.microsoft.com/office/drawing/2014/main" id="{6CF3C226-2563-DE44-8B21-583716B31E52}"/>
-              </a:ext>
-            </a:extLst>
-          </p:cNvPr>
-          <p:cNvGrpSpPr/>
-          <p:nvPr/>
-        </p:nvGrpSpPr>
-        <p:grpSpPr>
-          <a:xfrm>
-            <a:off x="8533581" y="4097903"/>
-            <a:ext cx="7374264" cy="784322"/>
-            <a:chOff x="7655317" y="6043852"/>
-            <a:chExt cx="11061396" cy="1176482"/>
-          </a:xfrm>
-        </p:grpSpPr>
-        <p:sp>
-          <p:nvSpPr>
-            <p:cNvPr id="46" name="TextBox 45">
-              <a:extLst>
-                <a:ext uri="{FF2B5EF4-FFF2-40B4-BE49-F238E27FC236}">
-                  <a16:creationId xmlns:a16="http://schemas.microsoft.com/office/drawing/2014/main" id="{A0F06E5F-AB38-5745-AC95-E7B4DBF17261}"/>
-                </a:ext>
-              </a:extLst>
-            </p:cNvPr>
-            <p:cNvSpPr txBox="1"/>
-            <p:nvPr/>
-          </p:nvSpPr>
-          <p:spPr>
-            <a:xfrm>
-              <a:off x="7655317" y="6043852"/>
-              <a:ext cx="6047810" cy="969496"/>
-            </a:xfrm>
-            <a:prstGeom prst="rect">
-              <a:avLst/>
-            </a:prstGeom>
-            <a:noFill/>
-          </p:spPr>
-          <p:txBody>
-            <a:bodyPr wrap="none" rtlCol="0">
-              <a:spAutoFit/>
-            </a:bodyPr>
-            <a:lstStyle/>
-            <a:p>
-              <a:r>
-                <a:rPr lang="en-US" sz="3600" dirty="0">
-                  <a:solidFill>
-                    <a:srgbClr val="2E2D29"/>
-                  </a:solidFill>
-                  <a:latin typeface="Source Sans Pro Regular"/>
-                </a:rPr>
-                <a:t>Example Section 2</a:t>
-              </a:r>
-            </a:p>
-          </p:txBody>
-        </p:sp>
-        <p:sp>
-          <p:nvSpPr>
-            <p:cNvPr id="47" name="Rectangle 46">
-              <a:extLst>
-                <a:ext uri="{FF2B5EF4-FFF2-40B4-BE49-F238E27FC236}">
-                  <a16:creationId xmlns:a16="http://schemas.microsoft.com/office/drawing/2014/main" id="{933BD69A-3BC9-184A-BA29-A499013F3D92}"/>
-                </a:ext>
-              </a:extLst>
-            </p:cNvPr>
-            <p:cNvSpPr/>
-            <p:nvPr/>
-          </p:nvSpPr>
-          <p:spPr>
-            <a:xfrm>
-              <a:off x="7743913" y="7174616"/>
-              <a:ext cx="10972800" cy="45718"/>
-            </a:xfrm>
-            <a:prstGeom prst="rect">
-              <a:avLst/>
-            </a:prstGeom>
-            <a:solidFill>
-              <a:srgbClr val="D2C295"/>
-            </a:solidFill>
-            <a:ln>
-              <a:solidFill>
-                <a:srgbClr val="D2C295"/>
-              </a:solidFill>
-            </a:ln>
-          </p:spPr>
-          <p:style>
-            <a:lnRef idx="2">
-              <a:schemeClr val="accent1">
-                <a:shade val="50000"/>
-              </a:schemeClr>
-            </a:lnRef>
-            <a:fillRef idx="1">
-              <a:schemeClr val="accent1"/>
-            </a:fillRef>
-            <a:effectRef idx="0">
-              <a:schemeClr val="accent1"/>
-            </a:effectRef>
-            <a:fontRef idx="minor">
-              <a:schemeClr val="lt1"/>
-            </a:fontRef>
-          </p:style>
-          <p:txBody>
-            <a:bodyPr rot="0" spcFirstLastPara="0" vertOverflow="overflow" horzOverflow="overflow" vert="horz" wrap="square" lIns="60960" tIns="30480" rIns="60960" bIns="30480" numCol="1" spcCol="0" rtlCol="0" fromWordArt="0" anchor="ctr" anchorCtr="0" forceAA="0" compatLnSpc="1">
-              <a:prstTxWarp prst="textNoShape">
-                <a:avLst/>
-              </a:prstTxWarp>
-              <a:noAutofit/>
-            </a:bodyPr>
-            <a:lstStyle/>
-            <a:p>
-              <a:pPr algn="ctr"/>
-              <a:endParaRPr lang="en-US" sz="3456"/>
-            </a:p>
-          </p:txBody>
-        </p:sp>
-      </p:grpSp>
-      <p:grpSp>
-        <p:nvGrpSpPr>
-          <p:cNvPr id="48" name="Group 47">
-            <a:extLst>
-              <a:ext uri="{FF2B5EF4-FFF2-40B4-BE49-F238E27FC236}">
-                <a16:creationId xmlns:a16="http://schemas.microsoft.com/office/drawing/2014/main" id="{DEE10B5D-BFB4-8446-94E8-C2FA40BE02B9}"/>
-              </a:ext>
-            </a:extLst>
-          </p:cNvPr>
-          <p:cNvGrpSpPr/>
-          <p:nvPr/>
-        </p:nvGrpSpPr>
-        <p:grpSpPr>
-          <a:xfrm>
-            <a:off x="16846360" y="4097903"/>
-            <a:ext cx="7374264" cy="784322"/>
-            <a:chOff x="7655317" y="6043852"/>
-            <a:chExt cx="11061396" cy="1176482"/>
-          </a:xfrm>
-        </p:grpSpPr>
-        <p:sp>
-          <p:nvSpPr>
-            <p:cNvPr id="49" name="TextBox 48">
-              <a:extLst>
-                <a:ext uri="{FF2B5EF4-FFF2-40B4-BE49-F238E27FC236}">
-                  <a16:creationId xmlns:a16="http://schemas.microsoft.com/office/drawing/2014/main" id="{1660BD0F-9FEE-5E4D-B5A5-37BA29ED64F6}"/>
-                </a:ext>
-              </a:extLst>
-            </p:cNvPr>
-            <p:cNvSpPr txBox="1"/>
-            <p:nvPr/>
-          </p:nvSpPr>
-          <p:spPr>
-            <a:xfrm>
-              <a:off x="7655317" y="6043852"/>
-              <a:ext cx="6047810" cy="969496"/>
-            </a:xfrm>
-            <a:prstGeom prst="rect">
-              <a:avLst/>
-            </a:prstGeom>
-            <a:noFill/>
-          </p:spPr>
-          <p:txBody>
-            <a:bodyPr wrap="none" rtlCol="0">
-              <a:spAutoFit/>
-            </a:bodyPr>
-            <a:lstStyle/>
-            <a:p>
-              <a:r>
-                <a:rPr lang="en-US" sz="3600" dirty="0">
-                  <a:solidFill>
-                    <a:srgbClr val="2E2D29"/>
-                  </a:solidFill>
-                  <a:latin typeface="Source Sans Pro Regular"/>
-                </a:rPr>
-                <a:t>Example Section 3</a:t>
-              </a:r>
-            </a:p>
-          </p:txBody>
-        </p:sp>
-        <p:sp>
-          <p:nvSpPr>
-            <p:cNvPr id="50" name="Rectangle 49">
-              <a:extLst>
-                <a:ext uri="{FF2B5EF4-FFF2-40B4-BE49-F238E27FC236}">
-                  <a16:creationId xmlns:a16="http://schemas.microsoft.com/office/drawing/2014/main" id="{EFF684F2-5F40-134D-A78D-AF6B2D54AC0E}"/>
-                </a:ext>
-              </a:extLst>
-            </p:cNvPr>
-            <p:cNvSpPr/>
-            <p:nvPr/>
-          </p:nvSpPr>
-          <p:spPr>
-            <a:xfrm>
-              <a:off x="7743913" y="7174616"/>
-              <a:ext cx="10972800" cy="45718"/>
-            </a:xfrm>
-            <a:prstGeom prst="rect">
-              <a:avLst/>
-            </a:prstGeom>
-            <a:solidFill>
-              <a:srgbClr val="D2C295"/>
-            </a:solidFill>
-            <a:ln>
-              <a:solidFill>
-                <a:srgbClr val="D2C295"/>
-              </a:solidFill>
-            </a:ln>
-          </p:spPr>
-          <p:style>
-            <a:lnRef idx="2">
-              <a:schemeClr val="accent1">
-                <a:shade val="50000"/>
-              </a:schemeClr>
-            </a:lnRef>
-            <a:fillRef idx="1">
-              <a:schemeClr val="accent1"/>
-            </a:fillRef>
-            <a:effectRef idx="0">
-              <a:schemeClr val="accent1"/>
-            </a:effectRef>
-            <a:fontRef idx="minor">
-              <a:schemeClr val="lt1"/>
-            </a:fontRef>
-          </p:style>
-          <p:txBody>
-            <a:bodyPr rot="0" spcFirstLastPara="0" vertOverflow="overflow" horzOverflow="overflow" vert="horz" wrap="square" lIns="60960" tIns="30480" rIns="60960" bIns="30480" numCol="1" spcCol="0" rtlCol="0" fromWordArt="0" anchor="ctr" anchorCtr="0" forceAA="0" compatLnSpc="1">
-              <a:prstTxWarp prst="textNoShape">
-                <a:avLst/>
-              </a:prstTxWarp>
-              <a:noAutofit/>
-            </a:bodyPr>
-            <a:lstStyle/>
-            <a:p>
-              <a:pPr algn="ctr"/>
-              <a:endParaRPr lang="en-US" sz="3456"/>
-            </a:p>
-          </p:txBody>
-        </p:sp>
-      </p:grpSp>
-      <p:grpSp>
-        <p:nvGrpSpPr>
-          <p:cNvPr id="51" name="Group 50">
-            <a:extLst>
-              <a:ext uri="{FF2B5EF4-FFF2-40B4-BE49-F238E27FC236}">
-                <a16:creationId xmlns:a16="http://schemas.microsoft.com/office/drawing/2014/main" id="{F8A61C06-B507-E04B-9DE5-7CE3AE2D3B6D}"/>
-              </a:ext>
-            </a:extLst>
-          </p:cNvPr>
-          <p:cNvGrpSpPr/>
-          <p:nvPr/>
-        </p:nvGrpSpPr>
-        <p:grpSpPr>
-          <a:xfrm>
-            <a:off x="25159140" y="4097903"/>
-            <a:ext cx="7374264" cy="784322"/>
-            <a:chOff x="7655317" y="6043852"/>
-            <a:chExt cx="11061396" cy="1176482"/>
-          </a:xfrm>
-        </p:grpSpPr>
-        <p:sp>
-          <p:nvSpPr>
-            <p:cNvPr id="52" name="TextBox 51">
-              <a:extLst>
-                <a:ext uri="{FF2B5EF4-FFF2-40B4-BE49-F238E27FC236}">
-                  <a16:creationId xmlns:a16="http://schemas.microsoft.com/office/drawing/2014/main" id="{36485A7E-1BBD-204E-80F2-0E6DCE7AC023}"/>
-                </a:ext>
-              </a:extLst>
-            </p:cNvPr>
-            <p:cNvSpPr txBox="1"/>
-            <p:nvPr/>
-          </p:nvSpPr>
-          <p:spPr>
-            <a:xfrm>
-              <a:off x="7655317" y="6043852"/>
-              <a:ext cx="6047810" cy="969496"/>
-            </a:xfrm>
-            <a:prstGeom prst="rect">
-              <a:avLst/>
-            </a:prstGeom>
-            <a:noFill/>
-          </p:spPr>
-          <p:txBody>
-            <a:bodyPr wrap="none" rtlCol="0">
-              <a:spAutoFit/>
-            </a:bodyPr>
-            <a:lstStyle/>
-            <a:p>
-              <a:r>
-                <a:rPr lang="en-US" sz="3600" dirty="0">
-                  <a:solidFill>
-                    <a:srgbClr val="2E2D29"/>
-                  </a:solidFill>
-                  <a:latin typeface="Source Sans Pro Regular"/>
-                </a:rPr>
-                <a:t>Example Section 4</a:t>
-              </a:r>
-            </a:p>
-          </p:txBody>
-        </p:sp>
-        <p:sp>
-          <p:nvSpPr>
-            <p:cNvPr id="53" name="Rectangle 52">
-              <a:extLst>
-                <a:ext uri="{FF2B5EF4-FFF2-40B4-BE49-F238E27FC236}">
-                  <a16:creationId xmlns:a16="http://schemas.microsoft.com/office/drawing/2014/main" id="{BA0DF22E-B77D-6E4F-A67F-7C79522BF513}"/>
-                </a:ext>
-              </a:extLst>
-            </p:cNvPr>
-            <p:cNvSpPr/>
-            <p:nvPr/>
-          </p:nvSpPr>
-          <p:spPr>
-            <a:xfrm>
-              <a:off x="7743913" y="7174616"/>
-              <a:ext cx="10972800" cy="45718"/>
-            </a:xfrm>
-            <a:prstGeom prst="rect">
-              <a:avLst/>
-            </a:prstGeom>
-            <a:solidFill>
-              <a:srgbClr val="D2C295"/>
-            </a:solidFill>
-            <a:ln>
-              <a:solidFill>
-                <a:srgbClr val="D2C295"/>
-              </a:solidFill>
-            </a:ln>
-          </p:spPr>
-          <p:style>
-            <a:lnRef idx="2">
-              <a:schemeClr val="accent1">
-                <a:shade val="50000"/>
-              </a:schemeClr>
-            </a:lnRef>
-            <a:fillRef idx="1">
-              <a:schemeClr val="accent1"/>
-            </a:fillRef>
-            <a:effectRef idx="0">
-              <a:schemeClr val="accent1"/>
-            </a:effectRef>
-            <a:fontRef idx="minor">
-              <a:schemeClr val="lt1"/>
-            </a:fontRef>
-          </p:style>
-          <p:txBody>
-            <a:bodyPr rot="0" spcFirstLastPara="0" vertOverflow="overflow" horzOverflow="overflow" vert="horz" wrap="square" lIns="60960" tIns="30480" rIns="60960" bIns="30480" numCol="1" spcCol="0" rtlCol="0" fromWordArt="0" anchor="ctr" anchorCtr="0" forceAA="0" compatLnSpc="1">
-              <a:prstTxWarp prst="textNoShape">
-                <a:avLst/>
-              </a:prstTxWarp>
-              <a:noAutofit/>
-            </a:bodyPr>
-            <a:lstStyle/>
-            <a:p>
-              <a:pPr algn="ctr"/>
-              <a:endParaRPr lang="en-US" sz="3456"/>
-            </a:p>
-          </p:txBody>
-        </p:sp>
-      </p:grpSp>
-    </p:spTree>
-    <p:extLst>
-      <p:ext uri="{BB962C8B-B14F-4D97-AF65-F5344CB8AC3E}">
-        <p14:creationId xmlns:p14="http://schemas.microsoft.com/office/powerpoint/2010/main" val="3173212375"/>
       </p:ext>
     </p:extLst>
   </p:cSld>

</xml_diff>

<commit_message>
Added some poster info, completed naive and DFT, some MFCC edits
</commit_message>
<xml_diff>
--- a/poster.pptx
+++ b/poster.pptx
@@ -3573,8 +3573,8 @@
         </p:nvSpPr>
         <p:spPr>
           <a:xfrm>
-            <a:off x="7685170" y="597483"/>
-            <a:ext cx="21270830" cy="1015663"/>
+            <a:off x="6967728" y="597483"/>
+            <a:ext cx="21988272" cy="1015663"/>
           </a:xfrm>
           <a:prstGeom prst="rect">
             <a:avLst/>
@@ -3684,8 +3684,8 @@
         </p:nvSpPr>
         <p:spPr>
           <a:xfrm>
-            <a:off x="7575442" y="1551479"/>
-            <a:ext cx="21270830" cy="707886"/>
+            <a:off x="6858000" y="1551479"/>
+            <a:ext cx="21988272" cy="707886"/>
           </a:xfrm>
           <a:prstGeom prst="rect">
             <a:avLst/>
@@ -3866,7 +3866,7 @@
           <p:spPr>
             <a:xfrm>
               <a:off x="7655317" y="6043852"/>
-              <a:ext cx="6047810" cy="969497"/>
+              <a:ext cx="2501166" cy="969497"/>
             </a:xfrm>
             <a:prstGeom prst="rect">
               <a:avLst/>
@@ -3886,7 +3886,7 @@
                   </a:solidFill>
                   <a:latin typeface="Source Sans Pro Regular"/>
                 </a:rPr>
-                <a:t>Example Section 1</a:t>
+                <a:t>Dataset</a:t>
               </a:r>
             </a:p>
           </p:txBody>
@@ -4206,7 +4206,7 @@
         <p:spPr>
           <a:xfrm>
             <a:off x="527715" y="5082822"/>
-            <a:ext cx="4167054" cy="14496276"/>
+            <a:ext cx="4167054" cy="9325630"/>
           </a:xfrm>
           <a:prstGeom prst="rect">
             <a:avLst/>
@@ -4221,1003 +4221,24 @@
           <a:p>
             <a:r>
               <a:rPr lang="en-US" sz="2400" dirty="0"/>
-              <a:t>Lorem ipsum dolor sit </a:t>
-            </a:r>
-            <a:r>
-              <a:rPr lang="en-US" sz="2400" dirty="0" err="1"/>
-              <a:t>amet</a:t>
-            </a:r>
-            <a:r>
-              <a:rPr lang="en-US" sz="2400" dirty="0"/>
-              <a:t>, </a:t>
-            </a:r>
-            <a:r>
-              <a:rPr lang="en-US" sz="2400" dirty="0" err="1"/>
-              <a:t>consectetur</a:t>
-            </a:r>
-            <a:r>
-              <a:rPr lang="en-US" sz="2400" dirty="0"/>
-              <a:t> </a:t>
-            </a:r>
-            <a:r>
-              <a:rPr lang="en-US" sz="2400" dirty="0" err="1"/>
-              <a:t>adipiscing</a:t>
-            </a:r>
-            <a:r>
-              <a:rPr lang="en-US" sz="2400" dirty="0"/>
-              <a:t> </a:t>
-            </a:r>
-            <a:r>
-              <a:rPr lang="en-US" sz="2400" dirty="0" err="1"/>
-              <a:t>elit</a:t>
-            </a:r>
-            <a:r>
-              <a:rPr lang="en-US" sz="2400" dirty="0"/>
-              <a:t>. </a:t>
-            </a:r>
-            <a:r>
-              <a:rPr lang="en-US" sz="2400" dirty="0" err="1"/>
-              <a:t>Etiam</a:t>
-            </a:r>
-            <a:r>
-              <a:rPr lang="en-US" sz="2400" dirty="0"/>
-              <a:t> </a:t>
-            </a:r>
-            <a:r>
-              <a:rPr lang="en-US" sz="2400" dirty="0" err="1"/>
-              <a:t>eget</a:t>
-            </a:r>
-            <a:r>
-              <a:rPr lang="en-US" sz="2400" dirty="0"/>
-              <a:t> </a:t>
-            </a:r>
-            <a:r>
-              <a:rPr lang="en-US" sz="2400" dirty="0" err="1"/>
-              <a:t>enim</a:t>
-            </a:r>
-            <a:r>
-              <a:rPr lang="en-US" sz="2400" dirty="0"/>
-              <a:t> </a:t>
-            </a:r>
-            <a:r>
-              <a:rPr lang="en-US" sz="2400" dirty="0" err="1"/>
-              <a:t>nec</a:t>
-            </a:r>
-            <a:r>
-              <a:rPr lang="en-US" sz="2400" dirty="0"/>
-              <a:t> ex </a:t>
-            </a:r>
-            <a:r>
-              <a:rPr lang="en-US" sz="2400" dirty="0" err="1"/>
-              <a:t>laoreet</a:t>
-            </a:r>
-            <a:r>
-              <a:rPr lang="en-US" sz="2400" dirty="0"/>
-              <a:t> </a:t>
-            </a:r>
-            <a:r>
-              <a:rPr lang="en-US" sz="2400" dirty="0" err="1"/>
-              <a:t>tempor</a:t>
-            </a:r>
-            <a:r>
-              <a:rPr lang="en-US" sz="2400" dirty="0"/>
-              <a:t> a </a:t>
-            </a:r>
-            <a:r>
-              <a:rPr lang="en-US" sz="2400" dirty="0" err="1"/>
-              <a:t>vel</a:t>
-            </a:r>
-            <a:r>
-              <a:rPr lang="en-US" sz="2400" dirty="0"/>
-              <a:t> </a:t>
-            </a:r>
-            <a:r>
-              <a:rPr lang="en-US" sz="2400" dirty="0" err="1"/>
-              <a:t>augue</a:t>
-            </a:r>
-            <a:r>
-              <a:rPr lang="en-US" sz="2400" dirty="0"/>
-              <a:t>. </a:t>
-            </a:r>
-            <a:r>
-              <a:rPr lang="en-US" sz="2400" dirty="0" err="1"/>
-              <a:t>Nullam</a:t>
-            </a:r>
-            <a:r>
-              <a:rPr lang="en-US" sz="2400" dirty="0"/>
-              <a:t> </a:t>
-            </a:r>
-            <a:r>
-              <a:rPr lang="en-US" sz="2400" dirty="0" err="1"/>
-              <a:t>consectetur</a:t>
-            </a:r>
-            <a:r>
-              <a:rPr lang="en-US" sz="2400" dirty="0"/>
-              <a:t> </a:t>
-            </a:r>
-            <a:r>
-              <a:rPr lang="en-US" sz="2400" dirty="0" err="1"/>
-              <a:t>nibh</a:t>
-            </a:r>
-            <a:r>
-              <a:rPr lang="en-US" sz="2400" dirty="0"/>
-              <a:t> </a:t>
-            </a:r>
-            <a:r>
-              <a:rPr lang="en-US" sz="2400" dirty="0" err="1"/>
-              <a:t>placerat</a:t>
-            </a:r>
-            <a:r>
-              <a:rPr lang="en-US" sz="2400" dirty="0"/>
-              <a:t>, </a:t>
-            </a:r>
-            <a:r>
-              <a:rPr lang="en-US" sz="2400" dirty="0" err="1"/>
-              <a:t>finibus</a:t>
-            </a:r>
-            <a:r>
-              <a:rPr lang="en-US" sz="2400" dirty="0"/>
-              <a:t> </a:t>
-            </a:r>
-            <a:r>
-              <a:rPr lang="en-US" sz="2400" dirty="0" err="1"/>
-              <a:t>felis</a:t>
-            </a:r>
-            <a:r>
-              <a:rPr lang="en-US" sz="2400" dirty="0"/>
-              <a:t> </a:t>
-            </a:r>
-            <a:r>
-              <a:rPr lang="en-US" sz="2400" dirty="0" err="1"/>
-              <a:t>placerat</a:t>
-            </a:r>
-            <a:r>
-              <a:rPr lang="en-US" sz="2400" dirty="0"/>
-              <a:t>, </a:t>
-            </a:r>
-            <a:r>
-              <a:rPr lang="en-US" sz="2400" dirty="0" err="1"/>
-              <a:t>blandit</a:t>
-            </a:r>
-            <a:r>
-              <a:rPr lang="en-US" sz="2400" dirty="0"/>
-              <a:t> </a:t>
-            </a:r>
-            <a:r>
-              <a:rPr lang="en-US" sz="2400" dirty="0" err="1"/>
-              <a:t>enim</a:t>
-            </a:r>
-            <a:r>
-              <a:rPr lang="en-US" sz="2400" dirty="0"/>
-              <a:t>. </a:t>
-            </a:r>
-            <a:r>
-              <a:rPr lang="en-US" sz="2400" dirty="0" err="1"/>
-              <a:t>Curabitur</a:t>
-            </a:r>
-            <a:r>
-              <a:rPr lang="en-US" sz="2400" dirty="0"/>
-              <a:t> </a:t>
-            </a:r>
-            <a:r>
-              <a:rPr lang="en-US" sz="2400" dirty="0" err="1"/>
-              <a:t>sed</a:t>
-            </a:r>
-            <a:r>
-              <a:rPr lang="en-US" sz="2400" dirty="0"/>
-              <a:t> </a:t>
-            </a:r>
-            <a:r>
-              <a:rPr lang="en-US" sz="2400" dirty="0" err="1"/>
-              <a:t>enim</a:t>
-            </a:r>
-            <a:r>
-              <a:rPr lang="en-US" sz="2400" dirty="0"/>
-              <a:t> </a:t>
-            </a:r>
-            <a:r>
-              <a:rPr lang="en-US" sz="2400" dirty="0" err="1"/>
-              <a:t>tellus</a:t>
-            </a:r>
-            <a:r>
-              <a:rPr lang="en-US" sz="2400" dirty="0"/>
-              <a:t>. Sed </a:t>
-            </a:r>
-            <a:r>
-              <a:rPr lang="en-US" sz="2400" dirty="0" err="1"/>
-              <a:t>posuere</a:t>
-            </a:r>
-            <a:r>
-              <a:rPr lang="en-US" sz="2400" dirty="0"/>
-              <a:t> </a:t>
-            </a:r>
-            <a:r>
-              <a:rPr lang="en-US" sz="2400" dirty="0" err="1"/>
-              <a:t>elementum</a:t>
-            </a:r>
-            <a:r>
-              <a:rPr lang="en-US" sz="2400" dirty="0"/>
-              <a:t> pulvinar. </a:t>
-            </a:r>
-            <a:r>
-              <a:rPr lang="en-US" sz="2400" dirty="0" err="1"/>
-              <a:t>Fusce</a:t>
-            </a:r>
-            <a:r>
-              <a:rPr lang="en-US" sz="2400" dirty="0"/>
-              <a:t> </a:t>
-            </a:r>
-            <a:r>
-              <a:rPr lang="en-US" sz="2400" dirty="0" err="1"/>
-              <a:t>sed</a:t>
-            </a:r>
-            <a:r>
-              <a:rPr lang="en-US" sz="2400" dirty="0"/>
-              <a:t> </a:t>
-            </a:r>
-            <a:r>
-              <a:rPr lang="en-US" sz="2400" dirty="0" err="1"/>
-              <a:t>aliquet</a:t>
-            </a:r>
-            <a:r>
-              <a:rPr lang="en-US" sz="2400" dirty="0"/>
-              <a:t> ante, id </a:t>
-            </a:r>
-            <a:r>
-              <a:rPr lang="en-US" sz="2400" dirty="0" err="1"/>
-              <a:t>imperdiet</a:t>
-            </a:r>
-            <a:r>
-              <a:rPr lang="en-US" sz="2400" dirty="0"/>
-              <a:t> magna. </a:t>
-            </a:r>
-            <a:r>
-              <a:rPr lang="en-US" sz="2400" dirty="0" err="1"/>
-              <a:t>Nulla</a:t>
-            </a:r>
-            <a:r>
-              <a:rPr lang="en-US" sz="2400" dirty="0"/>
-              <a:t> </a:t>
-            </a:r>
-            <a:r>
-              <a:rPr lang="en-US" sz="2400" dirty="0" err="1"/>
-              <a:t>facilisi</a:t>
-            </a:r>
-            <a:r>
-              <a:rPr lang="en-US" sz="2400" dirty="0"/>
-              <a:t>. Ut </a:t>
-            </a:r>
-            <a:r>
-              <a:rPr lang="en-US" sz="2400" dirty="0" err="1"/>
-              <a:t>viverra</a:t>
-            </a:r>
-            <a:r>
-              <a:rPr lang="en-US" sz="2400" dirty="0"/>
-              <a:t> </a:t>
-            </a:r>
-            <a:r>
-              <a:rPr lang="en-US" sz="2400" dirty="0" err="1"/>
-              <a:t>scelerisque</a:t>
-            </a:r>
-            <a:r>
-              <a:rPr lang="en-US" sz="2400" dirty="0"/>
-              <a:t> </a:t>
-            </a:r>
-            <a:r>
-              <a:rPr lang="en-US" sz="2400" dirty="0" err="1"/>
-              <a:t>nulla</a:t>
-            </a:r>
-            <a:r>
-              <a:rPr lang="en-US" sz="2400" dirty="0"/>
-              <a:t> vitae </a:t>
-            </a:r>
-            <a:r>
-              <a:rPr lang="en-US" sz="2400" dirty="0" err="1"/>
-              <a:t>faucibus</a:t>
-            </a:r>
-            <a:r>
-              <a:rPr lang="en-US" sz="2400" dirty="0"/>
-              <a:t>. Lorem ipsum dolor sit </a:t>
-            </a:r>
-            <a:r>
-              <a:rPr lang="en-US" sz="2400" dirty="0" err="1"/>
-              <a:t>amet</a:t>
-            </a:r>
-            <a:r>
-              <a:rPr lang="en-US" sz="2400" dirty="0"/>
-              <a:t>, </a:t>
-            </a:r>
-            <a:r>
-              <a:rPr lang="en-US" sz="2400" dirty="0" err="1"/>
-              <a:t>consectetur</a:t>
-            </a:r>
-            <a:r>
-              <a:rPr lang="en-US" sz="2400" dirty="0"/>
-              <a:t> </a:t>
-            </a:r>
-            <a:r>
-              <a:rPr lang="en-US" sz="2400" dirty="0" err="1"/>
-              <a:t>adipiscing</a:t>
-            </a:r>
-            <a:r>
-              <a:rPr lang="en-US" sz="2400" dirty="0"/>
-              <a:t> </a:t>
-            </a:r>
-            <a:r>
-              <a:rPr lang="en-US" sz="2400" dirty="0" err="1"/>
-              <a:t>elit</a:t>
-            </a:r>
-            <a:r>
-              <a:rPr lang="en-US" sz="2400" dirty="0"/>
-              <a:t>. </a:t>
-            </a:r>
-            <a:r>
-              <a:rPr lang="en-US" sz="2400" dirty="0" err="1"/>
-              <a:t>Praesent</a:t>
-            </a:r>
-            <a:r>
-              <a:rPr lang="en-US" sz="2400" dirty="0"/>
-              <a:t> </a:t>
-            </a:r>
-            <a:r>
-              <a:rPr lang="en-US" sz="2400" dirty="0" err="1"/>
-              <a:t>eget</a:t>
-            </a:r>
-            <a:r>
-              <a:rPr lang="en-US" sz="2400" dirty="0"/>
-              <a:t> </a:t>
-            </a:r>
-            <a:r>
-              <a:rPr lang="en-US" sz="2400" dirty="0" err="1"/>
-              <a:t>lobortis</a:t>
-            </a:r>
-            <a:r>
-              <a:rPr lang="en-US" sz="2400" dirty="0"/>
-              <a:t> </a:t>
-            </a:r>
-            <a:r>
-              <a:rPr lang="en-US" sz="2400" dirty="0" err="1"/>
-              <a:t>orci</a:t>
-            </a:r>
-            <a:r>
-              <a:rPr lang="en-US" sz="2400" dirty="0"/>
-              <a:t>. Nunc </a:t>
-            </a:r>
-            <a:r>
-              <a:rPr lang="en-US" sz="2400" dirty="0" err="1"/>
-              <a:t>nec</a:t>
-            </a:r>
-            <a:r>
-              <a:rPr lang="en-US" sz="2400" dirty="0"/>
-              <a:t> </a:t>
-            </a:r>
-            <a:r>
-              <a:rPr lang="en-US" sz="2400" dirty="0" err="1"/>
-              <a:t>lacus</a:t>
-            </a:r>
-            <a:r>
-              <a:rPr lang="en-US" sz="2400" dirty="0"/>
-              <a:t> non </a:t>
-            </a:r>
-            <a:r>
-              <a:rPr lang="en-US" sz="2400" dirty="0" err="1"/>
-              <a:t>nulla</a:t>
-            </a:r>
-            <a:r>
-              <a:rPr lang="en-US" sz="2400" dirty="0"/>
-              <a:t> </a:t>
-            </a:r>
-            <a:r>
-              <a:rPr lang="en-US" sz="2400" dirty="0" err="1"/>
-              <a:t>vulputate</a:t>
-            </a:r>
-            <a:r>
-              <a:rPr lang="en-US" sz="2400" dirty="0"/>
-              <a:t> </a:t>
-            </a:r>
-            <a:r>
-              <a:rPr lang="en-US" sz="2400" dirty="0" err="1"/>
-              <a:t>finibus</a:t>
-            </a:r>
-            <a:r>
-              <a:rPr lang="en-US" sz="2400" dirty="0"/>
-              <a:t> et a </a:t>
-            </a:r>
-            <a:r>
-              <a:rPr lang="en-US" sz="2400" dirty="0" err="1"/>
-              <a:t>purus</a:t>
-            </a:r>
-            <a:r>
-              <a:rPr lang="en-US" sz="2400" dirty="0"/>
-              <a:t>. </a:t>
-            </a:r>
-            <a:r>
-              <a:rPr lang="en-US" sz="2400" dirty="0" err="1"/>
-              <a:t>Pellentesque</a:t>
-            </a:r>
-            <a:r>
-              <a:rPr lang="en-US" sz="2400" dirty="0"/>
-              <a:t> </a:t>
-            </a:r>
-            <a:r>
-              <a:rPr lang="en-US" sz="2400" dirty="0" err="1"/>
-              <a:t>ut</a:t>
-            </a:r>
-            <a:r>
-              <a:rPr lang="en-US" sz="2400" dirty="0"/>
-              <a:t> </a:t>
-            </a:r>
-            <a:r>
-              <a:rPr lang="en-US" sz="2400" dirty="0" err="1"/>
-              <a:t>sapien</a:t>
-            </a:r>
-            <a:r>
-              <a:rPr lang="en-US" sz="2400" dirty="0"/>
-              <a:t> in </a:t>
-            </a:r>
-            <a:r>
-              <a:rPr lang="en-US" sz="2400" dirty="0" err="1"/>
-              <a:t>eros</a:t>
-            </a:r>
-            <a:r>
-              <a:rPr lang="en-US" sz="2400" dirty="0"/>
-              <a:t> </a:t>
-            </a:r>
-            <a:r>
-              <a:rPr lang="en-US" sz="2400" dirty="0" err="1"/>
-              <a:t>pretium</a:t>
-            </a:r>
-            <a:r>
-              <a:rPr lang="en-US" sz="2400" dirty="0"/>
-              <a:t> </a:t>
-            </a:r>
-            <a:r>
-              <a:rPr lang="en-US" sz="2400" dirty="0" err="1"/>
-              <a:t>porttitor</a:t>
-            </a:r>
-            <a:r>
-              <a:rPr lang="en-US" sz="2400" dirty="0"/>
-              <a:t>. </a:t>
-            </a:r>
-            <a:r>
-              <a:rPr lang="en-US" sz="2400" dirty="0" err="1"/>
-              <a:t>Nullam</a:t>
-            </a:r>
-            <a:r>
-              <a:rPr lang="en-US" sz="2400" dirty="0"/>
-              <a:t> </a:t>
-            </a:r>
-            <a:r>
-              <a:rPr lang="en-US" sz="2400" dirty="0" err="1"/>
-              <a:t>odio</a:t>
-            </a:r>
-            <a:r>
-              <a:rPr lang="en-US" sz="2400" dirty="0"/>
-              <a:t> </a:t>
-            </a:r>
-            <a:r>
-              <a:rPr lang="en-US" sz="2400" dirty="0" err="1"/>
-              <a:t>enim</a:t>
-            </a:r>
-            <a:r>
-              <a:rPr lang="en-US" sz="2400" dirty="0"/>
-              <a:t>, </a:t>
-            </a:r>
-            <a:r>
-              <a:rPr lang="en-US" sz="2400" dirty="0" err="1"/>
-              <a:t>elementum</a:t>
-            </a:r>
-            <a:r>
-              <a:rPr lang="en-US" sz="2400" dirty="0"/>
-              <a:t> sit </a:t>
-            </a:r>
-            <a:r>
-              <a:rPr lang="en-US" sz="2400" dirty="0" err="1"/>
-              <a:t>amet</a:t>
-            </a:r>
-            <a:r>
-              <a:rPr lang="en-US" sz="2400" dirty="0"/>
-              <a:t> cursus </a:t>
-            </a:r>
-            <a:r>
-              <a:rPr lang="en-US" sz="2400" dirty="0" err="1"/>
-              <a:t>nec</a:t>
-            </a:r>
-            <a:r>
-              <a:rPr lang="en-US" sz="2400" dirty="0"/>
-              <a:t>, </a:t>
-            </a:r>
-            <a:r>
-              <a:rPr lang="en-US" sz="2400" dirty="0" err="1"/>
-              <a:t>vehicula</a:t>
-            </a:r>
-            <a:r>
-              <a:rPr lang="en-US" sz="2400" dirty="0"/>
-              <a:t> vitae dui.</a:t>
-            </a:r>
-          </a:p>
-          <a:p>
-            <a:r>
-              <a:rPr lang="en-US" sz="2400" dirty="0" err="1"/>
-              <a:t>Suspendisse</a:t>
-            </a:r>
-            <a:r>
-              <a:rPr lang="en-US" sz="2400" dirty="0"/>
-              <a:t> </a:t>
-            </a:r>
-            <a:r>
-              <a:rPr lang="en-US" sz="2400" dirty="0" err="1"/>
-              <a:t>metus</a:t>
-            </a:r>
-            <a:r>
-              <a:rPr lang="en-US" sz="2400" dirty="0"/>
-              <a:t> ante, </a:t>
-            </a:r>
-            <a:r>
-              <a:rPr lang="en-US" sz="2400" dirty="0" err="1"/>
-              <a:t>laoreet</a:t>
-            </a:r>
-            <a:r>
-              <a:rPr lang="en-US" sz="2400" dirty="0"/>
-              <a:t> </a:t>
-            </a:r>
-            <a:r>
-              <a:rPr lang="en-US" sz="2400" dirty="0" err="1"/>
-              <a:t>nec</a:t>
-            </a:r>
-            <a:r>
-              <a:rPr lang="en-US" sz="2400" dirty="0"/>
-              <a:t> </a:t>
-            </a:r>
-            <a:r>
-              <a:rPr lang="en-US" sz="2400" dirty="0" err="1"/>
-              <a:t>urna</a:t>
-            </a:r>
-            <a:r>
-              <a:rPr lang="en-US" sz="2400" dirty="0"/>
-              <a:t> </a:t>
-            </a:r>
-            <a:r>
-              <a:rPr lang="en-US" sz="2400" dirty="0" err="1"/>
-              <a:t>eu</a:t>
-            </a:r>
-            <a:r>
-              <a:rPr lang="en-US" sz="2400" dirty="0"/>
-              <a:t>, convallis </a:t>
-            </a:r>
-            <a:r>
-              <a:rPr lang="en-US" sz="2400" dirty="0" err="1"/>
-              <a:t>hendrerit</a:t>
-            </a:r>
-            <a:r>
-              <a:rPr lang="en-US" sz="2400" dirty="0"/>
-              <a:t> libero. Duis ac </a:t>
-            </a:r>
-            <a:r>
-              <a:rPr lang="en-US" sz="2400" dirty="0" err="1"/>
-              <a:t>nisl</a:t>
-            </a:r>
-            <a:r>
-              <a:rPr lang="en-US" sz="2400" dirty="0"/>
-              <a:t> </a:t>
-            </a:r>
-            <a:r>
-              <a:rPr lang="en-US" sz="2400" dirty="0" err="1"/>
-              <a:t>risus</a:t>
-            </a:r>
-            <a:r>
-              <a:rPr lang="en-US" sz="2400" dirty="0"/>
-              <a:t>. </a:t>
-            </a:r>
-            <a:r>
-              <a:rPr lang="en-US" sz="2400" dirty="0" err="1"/>
-              <a:t>Sed</a:t>
-            </a:r>
-            <a:r>
-              <a:rPr lang="en-US" sz="2400" dirty="0"/>
-              <a:t> </a:t>
-            </a:r>
-            <a:r>
-              <a:rPr lang="en-US" sz="2400" dirty="0" err="1"/>
-              <a:t>luctus</a:t>
-            </a:r>
-            <a:r>
-              <a:rPr lang="en-US" sz="2400" dirty="0"/>
-              <a:t> </a:t>
-            </a:r>
-            <a:r>
-              <a:rPr lang="en-US" sz="2400" dirty="0" err="1"/>
-              <a:t>nulla</a:t>
-            </a:r>
-            <a:r>
-              <a:rPr lang="en-US" sz="2400" dirty="0"/>
-              <a:t> non </a:t>
-            </a:r>
-            <a:r>
-              <a:rPr lang="en-US" sz="2400" dirty="0" err="1"/>
-              <a:t>erat</a:t>
-            </a:r>
-            <a:r>
-              <a:rPr lang="en-US" sz="2400" dirty="0"/>
-              <a:t> pulvinar, </a:t>
-            </a:r>
-            <a:r>
-              <a:rPr lang="en-US" sz="2400" dirty="0" err="1"/>
-              <a:t>vel</a:t>
-            </a:r>
-            <a:r>
-              <a:rPr lang="en-US" sz="2400" dirty="0"/>
-              <a:t> </a:t>
-            </a:r>
-            <a:r>
-              <a:rPr lang="en-US" sz="2400" dirty="0" err="1"/>
-              <a:t>porttitor</a:t>
-            </a:r>
-            <a:r>
-              <a:rPr lang="en-US" sz="2400" dirty="0"/>
-              <a:t> </a:t>
-            </a:r>
-            <a:r>
-              <a:rPr lang="en-US" sz="2400" dirty="0" err="1"/>
-              <a:t>tellus</a:t>
-            </a:r>
-            <a:r>
-              <a:rPr lang="en-US" sz="2400" dirty="0"/>
-              <a:t> </a:t>
-            </a:r>
-            <a:r>
-              <a:rPr lang="en-US" sz="2400" dirty="0" err="1"/>
-              <a:t>pretium</a:t>
-            </a:r>
-            <a:r>
-              <a:rPr lang="en-US" sz="2400" dirty="0"/>
-              <a:t>. In fermentum </a:t>
-            </a:r>
-            <a:r>
-              <a:rPr lang="en-US" sz="2400" dirty="0" err="1"/>
-              <a:t>arcu</a:t>
-            </a:r>
-            <a:r>
-              <a:rPr lang="en-US" sz="2400" dirty="0"/>
-              <a:t> </a:t>
-            </a:r>
-            <a:r>
-              <a:rPr lang="en-US" sz="2400" dirty="0" err="1"/>
-              <a:t>ut</a:t>
-            </a:r>
-            <a:r>
-              <a:rPr lang="en-US" sz="2400" dirty="0"/>
-              <a:t> mi </a:t>
-            </a:r>
-            <a:r>
-              <a:rPr lang="en-US" sz="2400" dirty="0" err="1"/>
-              <a:t>mollis</a:t>
-            </a:r>
-            <a:r>
-              <a:rPr lang="en-US" sz="2400" dirty="0"/>
-              <a:t>, </a:t>
-            </a:r>
-            <a:r>
-              <a:rPr lang="en-US" sz="2400" dirty="0" err="1"/>
-              <a:t>nec</a:t>
-            </a:r>
-            <a:r>
-              <a:rPr lang="en-US" sz="2400" dirty="0"/>
-              <a:t> </a:t>
-            </a:r>
-            <a:r>
-              <a:rPr lang="en-US" sz="2400" dirty="0" err="1"/>
-              <a:t>iaculis</a:t>
-            </a:r>
-            <a:r>
-              <a:rPr lang="en-US" sz="2400" dirty="0"/>
-              <a:t> ipsum </a:t>
-            </a:r>
-            <a:r>
-              <a:rPr lang="en-US" sz="2400" dirty="0" err="1"/>
-              <a:t>rhoncus</a:t>
-            </a:r>
-            <a:r>
-              <a:rPr lang="en-US" sz="2400" dirty="0"/>
-              <a:t>. </a:t>
-            </a:r>
-            <a:r>
-              <a:rPr lang="en-US" sz="2400" dirty="0" err="1"/>
-              <a:t>Donec</a:t>
-            </a:r>
-            <a:r>
-              <a:rPr lang="en-US" sz="2400" dirty="0"/>
-              <a:t> cursus libero non </a:t>
-            </a:r>
-            <a:r>
-              <a:rPr lang="en-US" sz="2400" dirty="0" err="1"/>
-              <a:t>eros</a:t>
-            </a:r>
-            <a:r>
-              <a:rPr lang="en-US" sz="2400" dirty="0"/>
-              <a:t> </a:t>
-            </a:r>
-            <a:r>
-              <a:rPr lang="en-US" sz="2400" dirty="0" err="1"/>
-              <a:t>scelerisque</a:t>
-            </a:r>
-            <a:r>
-              <a:rPr lang="en-US" sz="2400" dirty="0"/>
-              <a:t> </a:t>
-            </a:r>
-            <a:r>
-              <a:rPr lang="en-US" sz="2400" dirty="0" err="1"/>
-              <a:t>euismod</a:t>
-            </a:r>
-            <a:r>
-              <a:rPr lang="en-US" sz="2400" dirty="0"/>
-              <a:t>. Nunc </a:t>
-            </a:r>
-            <a:r>
-              <a:rPr lang="en-US" sz="2400" dirty="0" err="1"/>
-              <a:t>diam</a:t>
-            </a:r>
-            <a:r>
-              <a:rPr lang="en-US" sz="2400" dirty="0"/>
-              <a:t> </a:t>
-            </a:r>
-            <a:r>
-              <a:rPr lang="en-US" sz="2400" dirty="0" err="1"/>
-              <a:t>arcu</a:t>
-            </a:r>
-            <a:r>
-              <a:rPr lang="en-US" sz="2400" dirty="0"/>
-              <a:t>, </a:t>
-            </a:r>
-            <a:r>
-              <a:rPr lang="en-US" sz="2400" dirty="0" err="1"/>
-              <a:t>aliquet</a:t>
-            </a:r>
-            <a:r>
-              <a:rPr lang="en-US" sz="2400" dirty="0"/>
-              <a:t> </a:t>
-            </a:r>
-            <a:r>
-              <a:rPr lang="en-US" sz="2400" dirty="0" err="1"/>
-              <a:t>eu</a:t>
-            </a:r>
-            <a:r>
-              <a:rPr lang="en-US" sz="2400" dirty="0"/>
-              <a:t> gravida vitae, </a:t>
-            </a:r>
-            <a:r>
-              <a:rPr lang="en-US" sz="2400" dirty="0" err="1"/>
-              <a:t>feugiat</a:t>
-            </a:r>
-            <a:r>
-              <a:rPr lang="en-US" sz="2400" dirty="0"/>
-              <a:t> </a:t>
-            </a:r>
-            <a:r>
-              <a:rPr lang="en-US" sz="2400" dirty="0" err="1"/>
-              <a:t>ut</a:t>
-            </a:r>
-            <a:r>
-              <a:rPr lang="en-US" sz="2400" dirty="0"/>
-              <a:t> </a:t>
-            </a:r>
-            <a:r>
-              <a:rPr lang="en-US" sz="2400" dirty="0" err="1"/>
-              <a:t>nulla</a:t>
-            </a:r>
-            <a:r>
-              <a:rPr lang="en-US" sz="2400" dirty="0"/>
-              <a:t>. Class </a:t>
-            </a:r>
-            <a:r>
-              <a:rPr lang="en-US" sz="2400" dirty="0" err="1"/>
-              <a:t>aptent</a:t>
-            </a:r>
-            <a:r>
-              <a:rPr lang="en-US" sz="2400" dirty="0"/>
-              <a:t> </a:t>
-            </a:r>
-            <a:r>
-              <a:rPr lang="en-US" sz="2400" dirty="0" err="1"/>
-              <a:t>taciti</a:t>
-            </a:r>
-            <a:r>
-              <a:rPr lang="en-US" sz="2400" dirty="0"/>
-              <a:t> </a:t>
-            </a:r>
-            <a:r>
-              <a:rPr lang="en-US" sz="2400" dirty="0" err="1"/>
-              <a:t>sociosqu</a:t>
-            </a:r>
-            <a:r>
-              <a:rPr lang="en-US" sz="2400" dirty="0"/>
-              <a:t> ad </a:t>
-            </a:r>
-            <a:r>
-              <a:rPr lang="en-US" sz="2400" dirty="0" err="1"/>
-              <a:t>litora</a:t>
-            </a:r>
-            <a:r>
-              <a:rPr lang="en-US" sz="2400" dirty="0"/>
-              <a:t> </a:t>
-            </a:r>
-            <a:r>
-              <a:rPr lang="en-US" sz="2400" dirty="0" err="1"/>
-              <a:t>torquent</a:t>
-            </a:r>
-            <a:r>
-              <a:rPr lang="en-US" sz="2400" dirty="0"/>
-              <a:t> per </a:t>
-            </a:r>
-            <a:r>
-              <a:rPr lang="en-US" sz="2400" dirty="0" err="1"/>
-              <a:t>conubia</a:t>
-            </a:r>
-            <a:r>
-              <a:rPr lang="en-US" sz="2400" dirty="0"/>
-              <a:t> nostra, per </a:t>
-            </a:r>
-            <a:r>
-              <a:rPr lang="en-US" sz="2400" dirty="0" err="1"/>
-              <a:t>inceptos</a:t>
-            </a:r>
-            <a:r>
-              <a:rPr lang="en-US" sz="2400" dirty="0"/>
-              <a:t> </a:t>
-            </a:r>
-            <a:r>
-              <a:rPr lang="en-US" sz="2400" dirty="0" err="1"/>
-              <a:t>himenaeos</a:t>
-            </a:r>
-            <a:r>
-              <a:rPr lang="en-US" sz="2400" dirty="0"/>
-              <a:t>.</a:t>
-            </a:r>
-          </a:p>
-          <a:p>
-            <a:r>
-              <a:rPr lang="en-US" sz="2400" dirty="0" err="1"/>
-              <a:t>Aenean</a:t>
-            </a:r>
-            <a:r>
-              <a:rPr lang="en-US" sz="2400" dirty="0"/>
-              <a:t> </a:t>
-            </a:r>
-            <a:r>
-              <a:rPr lang="en-US" sz="2400" dirty="0" err="1"/>
-              <a:t>mattis</a:t>
-            </a:r>
-            <a:r>
-              <a:rPr lang="en-US" sz="2400" dirty="0"/>
-              <a:t> </a:t>
-            </a:r>
-            <a:r>
-              <a:rPr lang="en-US" sz="2400" dirty="0" err="1"/>
-              <a:t>eros</a:t>
-            </a:r>
-            <a:r>
-              <a:rPr lang="en-US" sz="2400" dirty="0"/>
-              <a:t> vitae </a:t>
-            </a:r>
-            <a:r>
-              <a:rPr lang="en-US" sz="2400" dirty="0" err="1"/>
-              <a:t>neque</a:t>
-            </a:r>
-            <a:r>
-              <a:rPr lang="en-US" sz="2400" dirty="0"/>
-              <a:t> </a:t>
-            </a:r>
-            <a:r>
-              <a:rPr lang="en-US" sz="2400" dirty="0" err="1"/>
-              <a:t>varius</a:t>
-            </a:r>
-            <a:r>
-              <a:rPr lang="en-US" sz="2400" dirty="0"/>
-              <a:t> </a:t>
-            </a:r>
-            <a:r>
-              <a:rPr lang="en-US" sz="2400" dirty="0" err="1"/>
-              <a:t>commodo</a:t>
-            </a:r>
-            <a:r>
-              <a:rPr lang="en-US" sz="2400" dirty="0"/>
-              <a:t> </a:t>
-            </a:r>
-            <a:r>
-              <a:rPr lang="en-US" sz="2400" dirty="0" err="1"/>
-              <a:t>ut</a:t>
-            </a:r>
-            <a:r>
-              <a:rPr lang="en-US" sz="2400" dirty="0"/>
-              <a:t> </a:t>
-            </a:r>
-            <a:r>
-              <a:rPr lang="en-US" sz="2400" dirty="0" err="1"/>
-              <a:t>sed</a:t>
-            </a:r>
-            <a:r>
-              <a:rPr lang="en-US" sz="2400" dirty="0"/>
-              <a:t> </a:t>
-            </a:r>
-            <a:r>
-              <a:rPr lang="en-US" sz="2400" dirty="0" err="1"/>
-              <a:t>quam</a:t>
-            </a:r>
-            <a:r>
-              <a:rPr lang="en-US" sz="2400" dirty="0"/>
-              <a:t>. </a:t>
-            </a:r>
-            <a:r>
-              <a:rPr lang="en-US" sz="2400" dirty="0" err="1"/>
-              <a:t>Etiam</a:t>
-            </a:r>
-            <a:r>
-              <a:rPr lang="en-US" sz="2400" dirty="0"/>
-              <a:t> </a:t>
-            </a:r>
-            <a:r>
-              <a:rPr lang="en-US" sz="2400" dirty="0" err="1"/>
-              <a:t>ut</a:t>
-            </a:r>
-            <a:r>
-              <a:rPr lang="en-US" sz="2400" dirty="0"/>
-              <a:t> </a:t>
-            </a:r>
-            <a:r>
-              <a:rPr lang="en-US" sz="2400" dirty="0" err="1"/>
-              <a:t>purus</a:t>
-            </a:r>
-            <a:r>
-              <a:rPr lang="en-US" sz="2400" dirty="0"/>
-              <a:t> </a:t>
-            </a:r>
-            <a:r>
-              <a:rPr lang="en-US" sz="2400" dirty="0" err="1"/>
-              <a:t>vel</a:t>
-            </a:r>
-            <a:r>
-              <a:rPr lang="en-US" sz="2400" dirty="0"/>
-              <a:t> </a:t>
-            </a:r>
-            <a:r>
-              <a:rPr lang="en-US" sz="2400" dirty="0" err="1"/>
-              <a:t>urna</a:t>
-            </a:r>
-            <a:r>
-              <a:rPr lang="en-US" sz="2400" dirty="0"/>
-              <a:t> </a:t>
-            </a:r>
-            <a:r>
-              <a:rPr lang="en-US" sz="2400" dirty="0" err="1"/>
-              <a:t>facilisis</a:t>
-            </a:r>
-            <a:r>
-              <a:rPr lang="en-US" sz="2400" dirty="0"/>
-              <a:t> </a:t>
-            </a:r>
-            <a:r>
-              <a:rPr lang="en-US" sz="2400" dirty="0" err="1"/>
-              <a:t>porttitor</a:t>
-            </a:r>
-            <a:r>
-              <a:rPr lang="en-US" sz="2400" dirty="0"/>
-              <a:t> in </a:t>
-            </a:r>
-            <a:r>
-              <a:rPr lang="en-US" sz="2400" dirty="0" err="1"/>
-              <a:t>sed</a:t>
-            </a:r>
-            <a:r>
-              <a:rPr lang="en-US" sz="2400" dirty="0"/>
-              <a:t> </a:t>
-            </a:r>
-            <a:r>
-              <a:rPr lang="en-US" sz="2400" dirty="0" err="1"/>
-              <a:t>odio</a:t>
-            </a:r>
-            <a:r>
-              <a:rPr lang="en-US" sz="2400" dirty="0"/>
-              <a:t>. </a:t>
+              <a:t>This project aims to examine the role of signal processing in aiding audio classification, specifically detecting Covid-19 in cough audio files. During the pandemic, it took some time before the first accessible covid tests were released, posing a global health issue. If we were to collect data early on and use machine learning in the future, we would potentially be able to deploy these accessible tests at a much faster rate, and at significantly less cost.</a:t>
+            </a:r>
+          </a:p>
+          <a:p>
+            <a:endParaRPr lang="en-US" sz="2400" dirty="0">
+              <a:solidFill>
+                <a:srgbClr val="2E2D29"/>
+              </a:solidFill>
+            </a:endParaRPr>
+          </a:p>
+          <a:p>
+            <a:r>
+              <a:rPr lang="en-US" sz="2400" dirty="0">
+                <a:solidFill>
+                  <a:srgbClr val="2E2D29"/>
+                </a:solidFill>
+              </a:rPr>
+              <a:t>This project compares the accuracies of  different classification techniques, namely KNN, SVM, and ML, combined with different forms of signal processing on the COUGHVID dataset [1]. The types of processing used are: no processing, DFT, and MFCC.</a:t>
             </a:r>
             <a:endParaRPr lang="en-US" sz="1600" dirty="0">
               <a:solidFill>
@@ -5293,6 +4314,366 @@
               <a:extLst>
                 <a:ext uri="{FF2B5EF4-FFF2-40B4-BE49-F238E27FC236}">
                   <a16:creationId xmlns:a16="http://schemas.microsoft.com/office/drawing/2014/main" id="{5469B8E9-C40F-1948-BE8A-E5B431E4BC2C}"/>
+                </a:ext>
+              </a:extLst>
+            </p:cNvPr>
+            <p:cNvSpPr/>
+            <p:nvPr/>
+          </p:nvSpPr>
+          <p:spPr>
+            <a:xfrm>
+              <a:off x="7743913" y="7174616"/>
+              <a:ext cx="9601200" cy="45719"/>
+            </a:xfrm>
+            <a:prstGeom prst="rect">
+              <a:avLst/>
+            </a:prstGeom>
+            <a:solidFill>
+              <a:srgbClr val="8C1515"/>
+            </a:solidFill>
+            <a:ln>
+              <a:solidFill>
+                <a:srgbClr val="8C1515"/>
+              </a:solidFill>
+            </a:ln>
+          </p:spPr>
+          <p:style>
+            <a:lnRef idx="2">
+              <a:schemeClr val="accent1">
+                <a:shade val="50000"/>
+              </a:schemeClr>
+            </a:lnRef>
+            <a:fillRef idx="1">
+              <a:schemeClr val="accent1"/>
+            </a:fillRef>
+            <a:effectRef idx="0">
+              <a:schemeClr val="accent1"/>
+            </a:effectRef>
+            <a:fontRef idx="minor">
+              <a:schemeClr val="lt1"/>
+            </a:fontRef>
+          </p:style>
+          <p:txBody>
+            <a:bodyPr rot="0" spcFirstLastPara="0" vertOverflow="overflow" horzOverflow="overflow" vert="horz" wrap="square" lIns="60960" tIns="30480" rIns="60960" bIns="30480" numCol="1" spcCol="0" rtlCol="0" fromWordArt="0" anchor="ctr" anchorCtr="0" forceAA="0" compatLnSpc="1">
+              <a:prstTxWarp prst="textNoShape">
+                <a:avLst/>
+              </a:prstTxWarp>
+              <a:noAutofit/>
+            </a:bodyPr>
+            <a:lstStyle/>
+            <a:p>
+              <a:pPr algn="ctr"/>
+              <a:endParaRPr lang="en-US" sz="3456"/>
+            </a:p>
+          </p:txBody>
+        </p:sp>
+      </p:grpSp>
+      <p:grpSp>
+        <p:nvGrpSpPr>
+          <p:cNvPr id="12" name="Group 11">
+            <a:extLst>
+              <a:ext uri="{FF2B5EF4-FFF2-40B4-BE49-F238E27FC236}">
+                <a16:creationId xmlns:a16="http://schemas.microsoft.com/office/drawing/2014/main" id="{7DF78BC1-A123-9819-A980-6AF3803A07AE}"/>
+              </a:ext>
+            </a:extLst>
+          </p:cNvPr>
+          <p:cNvGrpSpPr/>
+          <p:nvPr/>
+        </p:nvGrpSpPr>
+        <p:grpSpPr>
+          <a:xfrm>
+            <a:off x="5287297" y="11375285"/>
+            <a:ext cx="6459864" cy="784322"/>
+            <a:chOff x="7655317" y="6043852"/>
+            <a:chExt cx="9689796" cy="1176483"/>
+          </a:xfrm>
+        </p:grpSpPr>
+        <p:sp>
+          <p:nvSpPr>
+            <p:cNvPr id="13" name="TextBox 12">
+              <a:extLst>
+                <a:ext uri="{FF2B5EF4-FFF2-40B4-BE49-F238E27FC236}">
+                  <a16:creationId xmlns:a16="http://schemas.microsoft.com/office/drawing/2014/main" id="{2674D513-E6B4-DA2B-02E3-3B8DCBE5D8EE}"/>
+                </a:ext>
+              </a:extLst>
+            </p:cNvPr>
+            <p:cNvSpPr txBox="1"/>
+            <p:nvPr/>
+          </p:nvSpPr>
+          <p:spPr>
+            <a:xfrm>
+              <a:off x="7655317" y="6043852"/>
+              <a:ext cx="5889113" cy="969497"/>
+            </a:xfrm>
+            <a:prstGeom prst="rect">
+              <a:avLst/>
+            </a:prstGeom>
+            <a:noFill/>
+          </p:spPr>
+          <p:txBody>
+            <a:bodyPr wrap="none" rtlCol="0">
+              <a:spAutoFit/>
+            </a:bodyPr>
+            <a:lstStyle/>
+            <a:p>
+              <a:r>
+                <a:rPr lang="en-US" sz="3600" dirty="0">
+                  <a:solidFill>
+                    <a:srgbClr val="2E2D29"/>
+                  </a:solidFill>
+                  <a:latin typeface="Source Sans Pro Regular"/>
+                </a:rPr>
+                <a:t>Data Preprocessing</a:t>
+              </a:r>
+            </a:p>
+          </p:txBody>
+        </p:sp>
+        <p:sp>
+          <p:nvSpPr>
+            <p:cNvPr id="14" name="Rectangle 13">
+              <a:extLst>
+                <a:ext uri="{FF2B5EF4-FFF2-40B4-BE49-F238E27FC236}">
+                  <a16:creationId xmlns:a16="http://schemas.microsoft.com/office/drawing/2014/main" id="{DDD5E209-F94E-E524-86FC-7050B6717942}"/>
+                </a:ext>
+              </a:extLst>
+            </p:cNvPr>
+            <p:cNvSpPr/>
+            <p:nvPr/>
+          </p:nvSpPr>
+          <p:spPr>
+            <a:xfrm>
+              <a:off x="7743913" y="7174616"/>
+              <a:ext cx="9601200" cy="45719"/>
+            </a:xfrm>
+            <a:prstGeom prst="rect">
+              <a:avLst/>
+            </a:prstGeom>
+            <a:solidFill>
+              <a:srgbClr val="8C1515"/>
+            </a:solidFill>
+            <a:ln>
+              <a:solidFill>
+                <a:srgbClr val="8C1515"/>
+              </a:solidFill>
+            </a:ln>
+          </p:spPr>
+          <p:style>
+            <a:lnRef idx="2">
+              <a:schemeClr val="accent1">
+                <a:shade val="50000"/>
+              </a:schemeClr>
+            </a:lnRef>
+            <a:fillRef idx="1">
+              <a:schemeClr val="accent1"/>
+            </a:fillRef>
+            <a:effectRef idx="0">
+              <a:schemeClr val="accent1"/>
+            </a:effectRef>
+            <a:fontRef idx="minor">
+              <a:schemeClr val="lt1"/>
+            </a:fontRef>
+          </p:style>
+          <p:txBody>
+            <a:bodyPr rot="0" spcFirstLastPara="0" vertOverflow="overflow" horzOverflow="overflow" vert="horz" wrap="square" lIns="60960" tIns="30480" rIns="60960" bIns="30480" numCol="1" spcCol="0" rtlCol="0" fromWordArt="0" anchor="ctr" anchorCtr="0" forceAA="0" compatLnSpc="1">
+              <a:prstTxWarp prst="textNoShape">
+                <a:avLst/>
+              </a:prstTxWarp>
+              <a:noAutofit/>
+            </a:bodyPr>
+            <a:lstStyle/>
+            <a:p>
+              <a:pPr algn="ctr"/>
+              <a:endParaRPr lang="en-US" sz="3456"/>
+            </a:p>
+          </p:txBody>
+        </p:sp>
+      </p:grpSp>
+      <p:grpSp>
+        <p:nvGrpSpPr>
+          <p:cNvPr id="15" name="Group 14">
+            <a:extLst>
+              <a:ext uri="{FF2B5EF4-FFF2-40B4-BE49-F238E27FC236}">
+                <a16:creationId xmlns:a16="http://schemas.microsoft.com/office/drawing/2014/main" id="{94A53317-1C16-C642-300E-5E06F302EB52}"/>
+              </a:ext>
+            </a:extLst>
+          </p:cNvPr>
+          <p:cNvGrpSpPr/>
+          <p:nvPr/>
+        </p:nvGrpSpPr>
+        <p:grpSpPr>
+          <a:xfrm>
+            <a:off x="26086615" y="9353476"/>
+            <a:ext cx="6459864" cy="784322"/>
+            <a:chOff x="7655317" y="6043852"/>
+            <a:chExt cx="9689796" cy="1176483"/>
+          </a:xfrm>
+        </p:grpSpPr>
+        <p:sp>
+          <p:nvSpPr>
+            <p:cNvPr id="18" name="TextBox 17">
+              <a:extLst>
+                <a:ext uri="{FF2B5EF4-FFF2-40B4-BE49-F238E27FC236}">
+                  <a16:creationId xmlns:a16="http://schemas.microsoft.com/office/drawing/2014/main" id="{50E3E3B2-DF2D-0D7B-B200-25F46EE0D79F}"/>
+                </a:ext>
+              </a:extLst>
+            </p:cNvPr>
+            <p:cNvSpPr txBox="1"/>
+            <p:nvPr/>
+          </p:nvSpPr>
+          <p:spPr>
+            <a:xfrm>
+              <a:off x="7655317" y="6043852"/>
+              <a:ext cx="3833262" cy="969497"/>
+            </a:xfrm>
+            <a:prstGeom prst="rect">
+              <a:avLst/>
+            </a:prstGeom>
+            <a:noFill/>
+          </p:spPr>
+          <p:txBody>
+            <a:bodyPr wrap="none" rtlCol="0">
+              <a:spAutoFit/>
+            </a:bodyPr>
+            <a:lstStyle/>
+            <a:p>
+              <a:r>
+                <a:rPr lang="en-US" sz="3600" dirty="0">
+                  <a:solidFill>
+                    <a:srgbClr val="2E2D29"/>
+                  </a:solidFill>
+                  <a:latin typeface="Source Sans Pro Regular"/>
+                </a:rPr>
+                <a:t>Future Work</a:t>
+              </a:r>
+            </a:p>
+          </p:txBody>
+        </p:sp>
+        <p:sp>
+          <p:nvSpPr>
+            <p:cNvPr id="19" name="Rectangle 18">
+              <a:extLst>
+                <a:ext uri="{FF2B5EF4-FFF2-40B4-BE49-F238E27FC236}">
+                  <a16:creationId xmlns:a16="http://schemas.microsoft.com/office/drawing/2014/main" id="{D5611B9D-7754-18EF-597F-7EC9CBEB4D65}"/>
+                </a:ext>
+              </a:extLst>
+            </p:cNvPr>
+            <p:cNvSpPr/>
+            <p:nvPr/>
+          </p:nvSpPr>
+          <p:spPr>
+            <a:xfrm>
+              <a:off x="7743913" y="7174616"/>
+              <a:ext cx="9601200" cy="45719"/>
+            </a:xfrm>
+            <a:prstGeom prst="rect">
+              <a:avLst/>
+            </a:prstGeom>
+            <a:solidFill>
+              <a:srgbClr val="8C1515"/>
+            </a:solidFill>
+            <a:ln>
+              <a:solidFill>
+                <a:srgbClr val="8C1515"/>
+              </a:solidFill>
+            </a:ln>
+          </p:spPr>
+          <p:style>
+            <a:lnRef idx="2">
+              <a:schemeClr val="accent1">
+                <a:shade val="50000"/>
+              </a:schemeClr>
+            </a:lnRef>
+            <a:fillRef idx="1">
+              <a:schemeClr val="accent1"/>
+            </a:fillRef>
+            <a:effectRef idx="0">
+              <a:schemeClr val="accent1"/>
+            </a:effectRef>
+            <a:fontRef idx="minor">
+              <a:schemeClr val="lt1"/>
+            </a:fontRef>
+          </p:style>
+          <p:txBody>
+            <a:bodyPr rot="0" spcFirstLastPara="0" vertOverflow="overflow" horzOverflow="overflow" vert="horz" wrap="square" lIns="60960" tIns="30480" rIns="60960" bIns="30480" numCol="1" spcCol="0" rtlCol="0" fromWordArt="0" anchor="ctr" anchorCtr="0" forceAA="0" compatLnSpc="1">
+              <a:prstTxWarp prst="textNoShape">
+                <a:avLst/>
+              </a:prstTxWarp>
+              <a:noAutofit/>
+            </a:bodyPr>
+            <a:lstStyle/>
+            <a:p>
+              <a:pPr algn="ctr"/>
+              <a:endParaRPr lang="en-US" sz="3456"/>
+            </a:p>
+          </p:txBody>
+        </p:sp>
+      </p:grpSp>
+      <p:grpSp>
+        <p:nvGrpSpPr>
+          <p:cNvPr id="22" name="Group 21">
+            <a:extLst>
+              <a:ext uri="{FF2B5EF4-FFF2-40B4-BE49-F238E27FC236}">
+                <a16:creationId xmlns:a16="http://schemas.microsoft.com/office/drawing/2014/main" id="{C41D0F48-58DF-AE07-CE59-5ACA44B1136A}"/>
+              </a:ext>
+            </a:extLst>
+          </p:cNvPr>
+          <p:cNvGrpSpPr/>
+          <p:nvPr/>
+        </p:nvGrpSpPr>
+        <p:grpSpPr>
+          <a:xfrm>
+            <a:off x="26040174" y="14236710"/>
+            <a:ext cx="6459864" cy="784322"/>
+            <a:chOff x="7655317" y="6043852"/>
+            <a:chExt cx="9689796" cy="1176483"/>
+          </a:xfrm>
+        </p:grpSpPr>
+        <p:sp>
+          <p:nvSpPr>
+            <p:cNvPr id="24" name="TextBox 23">
+              <a:extLst>
+                <a:ext uri="{FF2B5EF4-FFF2-40B4-BE49-F238E27FC236}">
+                  <a16:creationId xmlns:a16="http://schemas.microsoft.com/office/drawing/2014/main" id="{CFA374E0-5943-5869-9960-C6C01C5DC990}"/>
+                </a:ext>
+              </a:extLst>
+            </p:cNvPr>
+            <p:cNvSpPr txBox="1"/>
+            <p:nvPr/>
+          </p:nvSpPr>
+          <p:spPr>
+            <a:xfrm>
+              <a:off x="7655317" y="6043852"/>
+              <a:ext cx="3474990" cy="969497"/>
+            </a:xfrm>
+            <a:prstGeom prst="rect">
+              <a:avLst/>
+            </a:prstGeom>
+            <a:noFill/>
+          </p:spPr>
+          <p:txBody>
+            <a:bodyPr wrap="none" rtlCol="0">
+              <a:spAutoFit/>
+            </a:bodyPr>
+            <a:lstStyle/>
+            <a:p>
+              <a:r>
+                <a:rPr lang="en-US" sz="3600" dirty="0">
+                  <a:solidFill>
+                    <a:srgbClr val="2E2D29"/>
+                  </a:solidFill>
+                  <a:latin typeface="Source Sans Pro Regular"/>
+                </a:rPr>
+                <a:t>References</a:t>
+              </a:r>
+            </a:p>
+          </p:txBody>
+        </p:sp>
+        <p:sp>
+          <p:nvSpPr>
+            <p:cNvPr id="25" name="Rectangle 24">
+              <a:extLst>
+                <a:ext uri="{FF2B5EF4-FFF2-40B4-BE49-F238E27FC236}">
+                  <a16:creationId xmlns:a16="http://schemas.microsoft.com/office/drawing/2014/main" id="{A66838E2-B05B-63F5-7D20-224564715EFB}"/>
                 </a:ext>
               </a:extLst>
             </p:cNvPr>

</xml_diff>

<commit_message>
Plots file, finished poster
</commit_message>
<xml_diff>
--- a/poster.pptx
+++ b/poster.pptx
@@ -4,6 +4,9 @@
   <p:sldMasterIdLst>
     <p:sldMasterId id="2147483672" r:id="rId1"/>
   </p:sldMasterIdLst>
+  <p:notesMasterIdLst>
+    <p:notesMasterId r:id="rId3"/>
+  </p:notesMasterIdLst>
   <p:sldIdLst>
     <p:sldId id="258" r:id="rId2"/>
   </p:sldIdLst>
@@ -110,6 +113,439 @@
     </p:ext>
   </p:extLst>
 </p:presentation>
+</file>
+
+<file path=ppt/notesMasters/notesMaster1.xml><?xml version="1.0" encoding="utf-8"?>
+<p:notesMaster xmlns:a="http://schemas.openxmlformats.org/drawingml/2006/main" xmlns:r="http://schemas.openxmlformats.org/officeDocument/2006/relationships" xmlns:p="http://schemas.openxmlformats.org/presentationml/2006/main">
+  <p:cSld>
+    <p:bg>
+      <p:bgRef idx="1001">
+        <a:schemeClr val="bg1"/>
+      </p:bgRef>
+    </p:bg>
+    <p:spTree>
+      <p:nvGrpSpPr>
+        <p:cNvPr id="1" name=""/>
+        <p:cNvGrpSpPr/>
+        <p:nvPr/>
+      </p:nvGrpSpPr>
+      <p:grpSpPr>
+        <a:xfrm>
+          <a:off x="0" y="0"/>
+          <a:ext cx="0" cy="0"/>
+          <a:chOff x="0" y="0"/>
+          <a:chExt cx="0" cy="0"/>
+        </a:xfrm>
+      </p:grpSpPr>
+      <p:sp>
+        <p:nvSpPr>
+          <p:cNvPr id="2" name="Header Placeholder 1"/>
+          <p:cNvSpPr>
+            <a:spLocks noGrp="1"/>
+          </p:cNvSpPr>
+          <p:nvPr>
+            <p:ph type="hdr" sz="quarter"/>
+          </p:nvPr>
+        </p:nvSpPr>
+        <p:spPr>
+          <a:xfrm>
+            <a:off x="0" y="0"/>
+            <a:ext cx="2971800" cy="458788"/>
+          </a:xfrm>
+          <a:prstGeom prst="rect">
+            <a:avLst/>
+          </a:prstGeom>
+        </p:spPr>
+        <p:txBody>
+          <a:bodyPr vert="horz" lIns="91440" tIns="45720" rIns="91440" bIns="45720" rtlCol="0"/>
+          <a:lstStyle>
+            <a:lvl1pPr algn="l">
+              <a:defRPr sz="1200"/>
+            </a:lvl1pPr>
+          </a:lstStyle>
+          <a:p>
+            <a:endParaRPr lang="en-US"/>
+          </a:p>
+        </p:txBody>
+      </p:sp>
+      <p:sp>
+        <p:nvSpPr>
+          <p:cNvPr id="3" name="Date Placeholder 2"/>
+          <p:cNvSpPr>
+            <a:spLocks noGrp="1"/>
+          </p:cNvSpPr>
+          <p:nvPr>
+            <p:ph type="dt" idx="1"/>
+          </p:nvPr>
+        </p:nvSpPr>
+        <p:spPr>
+          <a:xfrm>
+            <a:off x="3884613" y="0"/>
+            <a:ext cx="2971800" cy="458788"/>
+          </a:xfrm>
+          <a:prstGeom prst="rect">
+            <a:avLst/>
+          </a:prstGeom>
+        </p:spPr>
+        <p:txBody>
+          <a:bodyPr vert="horz" lIns="91440" tIns="45720" rIns="91440" bIns="45720" rtlCol="0"/>
+          <a:lstStyle>
+            <a:lvl1pPr algn="r">
+              <a:defRPr sz="1200"/>
+            </a:lvl1pPr>
+          </a:lstStyle>
+          <a:p>
+            <a:fld id="{7B684897-F26B-4C33-9166-03E342212020}" type="datetimeFigureOut">
+              <a:rPr lang="en-US" smtClean="0"/>
+              <a:t>12/7/2023</a:t>
+            </a:fld>
+            <a:endParaRPr lang="en-US"/>
+          </a:p>
+        </p:txBody>
+      </p:sp>
+      <p:sp>
+        <p:nvSpPr>
+          <p:cNvPr id="4" name="Slide Image Placeholder 3"/>
+          <p:cNvSpPr>
+            <a:spLocks noGrp="1" noRot="1" noChangeAspect="1"/>
+          </p:cNvSpPr>
+          <p:nvPr>
+            <p:ph type="sldImg" idx="2"/>
+          </p:nvPr>
+        </p:nvSpPr>
+        <p:spPr>
+          <a:xfrm>
+            <a:off x="1114425" y="1143000"/>
+            <a:ext cx="4629150" cy="3086100"/>
+          </a:xfrm>
+          <a:prstGeom prst="rect">
+            <a:avLst/>
+          </a:prstGeom>
+          <a:noFill/>
+          <a:ln w="12700">
+            <a:solidFill>
+              <a:prstClr val="black"/>
+            </a:solidFill>
+          </a:ln>
+        </p:spPr>
+        <p:txBody>
+          <a:bodyPr vert="horz" lIns="91440" tIns="45720" rIns="91440" bIns="45720" rtlCol="0" anchor="ctr"/>
+          <a:lstStyle/>
+          <a:p>
+            <a:endParaRPr lang="en-US"/>
+          </a:p>
+        </p:txBody>
+      </p:sp>
+      <p:sp>
+        <p:nvSpPr>
+          <p:cNvPr id="5" name="Notes Placeholder 4"/>
+          <p:cNvSpPr>
+            <a:spLocks noGrp="1"/>
+          </p:cNvSpPr>
+          <p:nvPr>
+            <p:ph type="body" sz="quarter" idx="3"/>
+          </p:nvPr>
+        </p:nvSpPr>
+        <p:spPr>
+          <a:xfrm>
+            <a:off x="685800" y="4400550"/>
+            <a:ext cx="5486400" cy="3600450"/>
+          </a:xfrm>
+          <a:prstGeom prst="rect">
+            <a:avLst/>
+          </a:prstGeom>
+        </p:spPr>
+        <p:txBody>
+          <a:bodyPr vert="horz" lIns="91440" tIns="45720" rIns="91440" bIns="45720" rtlCol="0"/>
+          <a:lstStyle/>
+          <a:p>
+            <a:pPr lvl="0"/>
+            <a:r>
+              <a:rPr lang="en-US"/>
+              <a:t>Click to edit Master text styles</a:t>
+            </a:r>
+          </a:p>
+          <a:p>
+            <a:pPr lvl="1"/>
+            <a:r>
+              <a:rPr lang="en-US"/>
+              <a:t>Second level</a:t>
+            </a:r>
+          </a:p>
+          <a:p>
+            <a:pPr lvl="2"/>
+            <a:r>
+              <a:rPr lang="en-US"/>
+              <a:t>Third level</a:t>
+            </a:r>
+          </a:p>
+          <a:p>
+            <a:pPr lvl="3"/>
+            <a:r>
+              <a:rPr lang="en-US"/>
+              <a:t>Fourth level</a:t>
+            </a:r>
+          </a:p>
+          <a:p>
+            <a:pPr lvl="4"/>
+            <a:r>
+              <a:rPr lang="en-US"/>
+              <a:t>Fifth level</a:t>
+            </a:r>
+          </a:p>
+        </p:txBody>
+      </p:sp>
+      <p:sp>
+        <p:nvSpPr>
+          <p:cNvPr id="6" name="Footer Placeholder 5"/>
+          <p:cNvSpPr>
+            <a:spLocks noGrp="1"/>
+          </p:cNvSpPr>
+          <p:nvPr>
+            <p:ph type="ftr" sz="quarter" idx="4"/>
+          </p:nvPr>
+        </p:nvSpPr>
+        <p:spPr>
+          <a:xfrm>
+            <a:off x="0" y="8685213"/>
+            <a:ext cx="2971800" cy="458787"/>
+          </a:xfrm>
+          <a:prstGeom prst="rect">
+            <a:avLst/>
+          </a:prstGeom>
+        </p:spPr>
+        <p:txBody>
+          <a:bodyPr vert="horz" lIns="91440" tIns="45720" rIns="91440" bIns="45720" rtlCol="0" anchor="b"/>
+          <a:lstStyle>
+            <a:lvl1pPr algn="l">
+              <a:defRPr sz="1200"/>
+            </a:lvl1pPr>
+          </a:lstStyle>
+          <a:p>
+            <a:endParaRPr lang="en-US"/>
+          </a:p>
+        </p:txBody>
+      </p:sp>
+      <p:sp>
+        <p:nvSpPr>
+          <p:cNvPr id="7" name="Slide Number Placeholder 6"/>
+          <p:cNvSpPr>
+            <a:spLocks noGrp="1"/>
+          </p:cNvSpPr>
+          <p:nvPr>
+            <p:ph type="sldNum" sz="quarter" idx="5"/>
+          </p:nvPr>
+        </p:nvSpPr>
+        <p:spPr>
+          <a:xfrm>
+            <a:off x="3884613" y="8685213"/>
+            <a:ext cx="2971800" cy="458787"/>
+          </a:xfrm>
+          <a:prstGeom prst="rect">
+            <a:avLst/>
+          </a:prstGeom>
+        </p:spPr>
+        <p:txBody>
+          <a:bodyPr vert="horz" lIns="91440" tIns="45720" rIns="91440" bIns="45720" rtlCol="0" anchor="b"/>
+          <a:lstStyle>
+            <a:lvl1pPr algn="r">
+              <a:defRPr sz="1200"/>
+            </a:lvl1pPr>
+          </a:lstStyle>
+          <a:p>
+            <a:fld id="{214B6A26-CA19-4118-A298-3E413332D2DB}" type="slidenum">
+              <a:rPr lang="en-US" smtClean="0"/>
+              <a:t>‹#›</a:t>
+            </a:fld>
+            <a:endParaRPr lang="en-US"/>
+          </a:p>
+        </p:txBody>
+      </p:sp>
+    </p:spTree>
+    <p:extLst>
+      <p:ext uri="{BB962C8B-B14F-4D97-AF65-F5344CB8AC3E}">
+        <p14:creationId xmlns:p14="http://schemas.microsoft.com/office/powerpoint/2010/main" val="3978982464"/>
+      </p:ext>
+    </p:extLst>
+  </p:cSld>
+  <p:clrMap bg1="lt1" tx1="dk1" bg2="lt2" tx2="dk2" accent1="accent1" accent2="accent2" accent3="accent3" accent4="accent4" accent5="accent5" accent6="accent6" hlink="hlink" folHlink="folHlink"/>
+  <p:notesStyle>
+    <a:lvl1pPr marL="0" algn="l" defTabSz="914400" rtl="0" eaLnBrk="1" latinLnBrk="0" hangingPunct="1">
+      <a:defRPr sz="1200" kern="1200">
+        <a:solidFill>
+          <a:schemeClr val="tx1"/>
+        </a:solidFill>
+        <a:latin typeface="+mn-lt"/>
+        <a:ea typeface="+mn-ea"/>
+        <a:cs typeface="+mn-cs"/>
+      </a:defRPr>
+    </a:lvl1pPr>
+    <a:lvl2pPr marL="457200" algn="l" defTabSz="914400" rtl="0" eaLnBrk="1" latinLnBrk="0" hangingPunct="1">
+      <a:defRPr sz="1200" kern="1200">
+        <a:solidFill>
+          <a:schemeClr val="tx1"/>
+        </a:solidFill>
+        <a:latin typeface="+mn-lt"/>
+        <a:ea typeface="+mn-ea"/>
+        <a:cs typeface="+mn-cs"/>
+      </a:defRPr>
+    </a:lvl2pPr>
+    <a:lvl3pPr marL="914400" algn="l" defTabSz="914400" rtl="0" eaLnBrk="1" latinLnBrk="0" hangingPunct="1">
+      <a:defRPr sz="1200" kern="1200">
+        <a:solidFill>
+          <a:schemeClr val="tx1"/>
+        </a:solidFill>
+        <a:latin typeface="+mn-lt"/>
+        <a:ea typeface="+mn-ea"/>
+        <a:cs typeface="+mn-cs"/>
+      </a:defRPr>
+    </a:lvl3pPr>
+    <a:lvl4pPr marL="1371600" algn="l" defTabSz="914400" rtl="0" eaLnBrk="1" latinLnBrk="0" hangingPunct="1">
+      <a:defRPr sz="1200" kern="1200">
+        <a:solidFill>
+          <a:schemeClr val="tx1"/>
+        </a:solidFill>
+        <a:latin typeface="+mn-lt"/>
+        <a:ea typeface="+mn-ea"/>
+        <a:cs typeface="+mn-cs"/>
+      </a:defRPr>
+    </a:lvl4pPr>
+    <a:lvl5pPr marL="1828800" algn="l" defTabSz="914400" rtl="0" eaLnBrk="1" latinLnBrk="0" hangingPunct="1">
+      <a:defRPr sz="1200" kern="1200">
+        <a:solidFill>
+          <a:schemeClr val="tx1"/>
+        </a:solidFill>
+        <a:latin typeface="+mn-lt"/>
+        <a:ea typeface="+mn-ea"/>
+        <a:cs typeface="+mn-cs"/>
+      </a:defRPr>
+    </a:lvl5pPr>
+    <a:lvl6pPr marL="2286000" algn="l" defTabSz="914400" rtl="0" eaLnBrk="1" latinLnBrk="0" hangingPunct="1">
+      <a:defRPr sz="1200" kern="1200">
+        <a:solidFill>
+          <a:schemeClr val="tx1"/>
+        </a:solidFill>
+        <a:latin typeface="+mn-lt"/>
+        <a:ea typeface="+mn-ea"/>
+        <a:cs typeface="+mn-cs"/>
+      </a:defRPr>
+    </a:lvl6pPr>
+    <a:lvl7pPr marL="2743200" algn="l" defTabSz="914400" rtl="0" eaLnBrk="1" latinLnBrk="0" hangingPunct="1">
+      <a:defRPr sz="1200" kern="1200">
+        <a:solidFill>
+          <a:schemeClr val="tx1"/>
+        </a:solidFill>
+        <a:latin typeface="+mn-lt"/>
+        <a:ea typeface="+mn-ea"/>
+        <a:cs typeface="+mn-cs"/>
+      </a:defRPr>
+    </a:lvl7pPr>
+    <a:lvl8pPr marL="3200400" algn="l" defTabSz="914400" rtl="0" eaLnBrk="1" latinLnBrk="0" hangingPunct="1">
+      <a:defRPr sz="1200" kern="1200">
+        <a:solidFill>
+          <a:schemeClr val="tx1"/>
+        </a:solidFill>
+        <a:latin typeface="+mn-lt"/>
+        <a:ea typeface="+mn-ea"/>
+        <a:cs typeface="+mn-cs"/>
+      </a:defRPr>
+    </a:lvl8pPr>
+    <a:lvl9pPr marL="3657600" algn="l" defTabSz="914400" rtl="0" eaLnBrk="1" latinLnBrk="0" hangingPunct="1">
+      <a:defRPr sz="1200" kern="1200">
+        <a:solidFill>
+          <a:schemeClr val="tx1"/>
+        </a:solidFill>
+        <a:latin typeface="+mn-lt"/>
+        <a:ea typeface="+mn-ea"/>
+        <a:cs typeface="+mn-cs"/>
+      </a:defRPr>
+    </a:lvl9pPr>
+  </p:notesStyle>
+</p:notesMaster>
+</file>
+
+<file path=ppt/notesSlides/notesSlide1.xml><?xml version="1.0" encoding="utf-8"?>
+<p:notes xmlns:a="http://schemas.openxmlformats.org/drawingml/2006/main" xmlns:r="http://schemas.openxmlformats.org/officeDocument/2006/relationships" xmlns:p="http://schemas.openxmlformats.org/presentationml/2006/main">
+  <p:cSld>
+    <p:spTree>
+      <p:nvGrpSpPr>
+        <p:cNvPr id="1" name=""/>
+        <p:cNvGrpSpPr/>
+        <p:nvPr/>
+      </p:nvGrpSpPr>
+      <p:grpSpPr>
+        <a:xfrm>
+          <a:off x="0" y="0"/>
+          <a:ext cx="0" cy="0"/>
+          <a:chOff x="0" y="0"/>
+          <a:chExt cx="0" cy="0"/>
+        </a:xfrm>
+      </p:grpSpPr>
+      <p:sp>
+        <p:nvSpPr>
+          <p:cNvPr id="2" name="Slide Image Placeholder 1"/>
+          <p:cNvSpPr>
+            <a:spLocks noGrp="1" noRot="1" noChangeAspect="1"/>
+          </p:cNvSpPr>
+          <p:nvPr>
+            <p:ph type="sldImg"/>
+          </p:nvPr>
+        </p:nvSpPr>
+        <p:spPr/>
+      </p:sp>
+      <p:sp>
+        <p:nvSpPr>
+          <p:cNvPr id="3" name="Notes Placeholder 2"/>
+          <p:cNvSpPr>
+            <a:spLocks noGrp="1"/>
+          </p:cNvSpPr>
+          <p:nvPr>
+            <p:ph type="body" idx="1"/>
+          </p:nvPr>
+        </p:nvSpPr>
+        <p:spPr/>
+        <p:txBody>
+          <a:bodyPr/>
+          <a:lstStyle/>
+          <a:p>
+            <a:endParaRPr lang="en-US" dirty="0"/>
+          </a:p>
+        </p:txBody>
+      </p:sp>
+      <p:sp>
+        <p:nvSpPr>
+          <p:cNvPr id="4" name="Slide Number Placeholder 3"/>
+          <p:cNvSpPr>
+            <a:spLocks noGrp="1"/>
+          </p:cNvSpPr>
+          <p:nvPr>
+            <p:ph type="sldNum" sz="quarter" idx="5"/>
+          </p:nvPr>
+        </p:nvSpPr>
+        <p:spPr/>
+        <p:txBody>
+          <a:bodyPr/>
+          <a:lstStyle/>
+          <a:p>
+            <a:fld id="{214B6A26-CA19-4118-A298-3E413332D2DB}" type="slidenum">
+              <a:rPr lang="en-US" smtClean="0"/>
+              <a:t>1</a:t>
+            </a:fld>
+            <a:endParaRPr lang="en-US"/>
+          </a:p>
+        </p:txBody>
+      </p:sp>
+    </p:spTree>
+    <p:extLst>
+      <p:ext uri="{BB962C8B-B14F-4D97-AF65-F5344CB8AC3E}">
+        <p14:creationId xmlns:p14="http://schemas.microsoft.com/office/powerpoint/2010/main" val="326211851"/>
+      </p:ext>
+    </p:extLst>
+  </p:cSld>
+  <p:clrMapOvr>
+    <a:masterClrMapping/>
+  </p:clrMapOvr>
+</p:notes>
 </file>
 
 <file path=ppt/slideLayouts/slideLayout1.xml><?xml version="1.0" encoding="utf-8"?>
@@ -3153,7 +3589,7 @@
               <p:nvPr/>
             </p:nvPicPr>
             <p:blipFill>
-              <a:blip r:embed="rId2"/>
+              <a:blip r:embed="rId3"/>
               <a:stretch>
                 <a:fillRect/>
               </a:stretch>
@@ -3183,7 +3619,7 @@
               <p:nvPr/>
             </p:nvPicPr>
             <p:blipFill>
-              <a:blip r:embed="rId3"/>
+              <a:blip r:embed="rId4"/>
               <a:stretch>
                 <a:fillRect/>
               </a:stretch>
@@ -3356,7 +3792,7 @@
               <p:nvPr/>
             </p:nvPicPr>
             <p:blipFill>
-              <a:blip r:embed="rId4"/>
+              <a:blip r:embed="rId5"/>
               <a:stretch>
                 <a:fillRect/>
               </a:stretch>
@@ -3615,7 +4051,7 @@
           <p:nvPr/>
         </p:nvPicPr>
         <p:blipFill>
-          <a:blip r:embed="rId5"/>
+          <a:blip r:embed="rId6"/>
           <a:stretch>
             <a:fillRect/>
           </a:stretch>
@@ -3951,126 +4387,6 @@
           </p:txBody>
         </p:sp>
       </p:grpSp>
-      <p:grpSp>
-        <p:nvGrpSpPr>
-          <p:cNvPr id="62" name="Group 61">
-            <a:extLst>
-              <a:ext uri="{FF2B5EF4-FFF2-40B4-BE49-F238E27FC236}">
-                <a16:creationId xmlns:a16="http://schemas.microsoft.com/office/drawing/2014/main" id="{ACEA14DE-8F9D-3540-BDEA-CF05B502484E}"/>
-              </a:ext>
-            </a:extLst>
-          </p:cNvPr>
-          <p:cNvGrpSpPr/>
-          <p:nvPr/>
-        </p:nvGrpSpPr>
-        <p:grpSpPr>
-          <a:xfrm>
-            <a:off x="12201085" y="4067624"/>
-            <a:ext cx="13426178" cy="784322"/>
-            <a:chOff x="7655317" y="6043852"/>
-            <a:chExt cx="9689796" cy="1176483"/>
-          </a:xfrm>
-        </p:grpSpPr>
-        <p:sp>
-          <p:nvSpPr>
-            <p:cNvPr id="63" name="TextBox 62">
-              <a:extLst>
-                <a:ext uri="{FF2B5EF4-FFF2-40B4-BE49-F238E27FC236}">
-                  <a16:creationId xmlns:a16="http://schemas.microsoft.com/office/drawing/2014/main" id="{8B2B66A7-16CD-6549-BB01-B0174853116D}"/>
-                </a:ext>
-              </a:extLst>
-            </p:cNvPr>
-            <p:cNvSpPr txBox="1"/>
-            <p:nvPr/>
-          </p:nvSpPr>
-          <p:spPr>
-            <a:xfrm>
-              <a:off x="7655317" y="6043852"/>
-              <a:ext cx="4549805" cy="969497"/>
-            </a:xfrm>
-            <a:prstGeom prst="rect">
-              <a:avLst/>
-            </a:prstGeom>
-            <a:noFill/>
-          </p:spPr>
-          <p:txBody>
-            <a:bodyPr wrap="none" rtlCol="0">
-              <a:spAutoFit/>
-            </a:bodyPr>
-            <a:lstStyle/>
-            <a:p>
-              <a:r>
-                <a:rPr lang="en-US" sz="3600" dirty="0">
-                  <a:solidFill>
-                    <a:srgbClr val="2E2D29"/>
-                  </a:solidFill>
-                  <a:latin typeface="Source Sans Pro Regular"/>
-                </a:rPr>
-                <a:t>Results &amp; Plots</a:t>
-              </a:r>
-            </a:p>
-          </p:txBody>
-        </p:sp>
-        <p:sp>
-          <p:nvSpPr>
-            <p:cNvPr id="64" name="Rectangle 63">
-              <a:extLst>
-                <a:ext uri="{FF2B5EF4-FFF2-40B4-BE49-F238E27FC236}">
-                  <a16:creationId xmlns:a16="http://schemas.microsoft.com/office/drawing/2014/main" id="{953C88DA-D030-304B-8222-63AF4DAA0C0C}"/>
-                </a:ext>
-              </a:extLst>
-            </p:cNvPr>
-            <p:cNvSpPr/>
-            <p:nvPr/>
-          </p:nvSpPr>
-          <p:spPr>
-            <a:xfrm>
-              <a:off x="7743913" y="7174616"/>
-              <a:ext cx="9601200" cy="45719"/>
-            </a:xfrm>
-            <a:prstGeom prst="rect">
-              <a:avLst/>
-            </a:prstGeom>
-            <a:solidFill>
-              <a:srgbClr val="8C1515"/>
-            </a:solidFill>
-            <a:ln>
-              <a:solidFill>
-                <a:srgbClr val="8C1515"/>
-              </a:solidFill>
-            </a:ln>
-          </p:spPr>
-          <p:style>
-            <a:lnRef idx="2">
-              <a:schemeClr val="accent1">
-                <a:shade val="50000"/>
-              </a:schemeClr>
-            </a:lnRef>
-            <a:fillRef idx="1">
-              <a:schemeClr val="accent1"/>
-            </a:fillRef>
-            <a:effectRef idx="0">
-              <a:schemeClr val="accent1"/>
-            </a:effectRef>
-            <a:fontRef idx="minor">
-              <a:schemeClr val="lt1"/>
-            </a:fontRef>
-          </p:style>
-          <p:txBody>
-            <a:bodyPr rot="0" spcFirstLastPara="0" vertOverflow="overflow" horzOverflow="overflow" vert="horz" wrap="square" lIns="60960" tIns="30480" rIns="60960" bIns="30480" numCol="1" spcCol="0" rtlCol="0" fromWordArt="0" anchor="ctr" anchorCtr="0" forceAA="0" compatLnSpc="1">
-              <a:prstTxWarp prst="textNoShape">
-                <a:avLst/>
-              </a:prstTxWarp>
-              <a:noAutofit/>
-            </a:bodyPr>
-            <a:lstStyle/>
-            <a:p>
-              <a:pPr algn="ctr"/>
-              <a:endParaRPr lang="en-US" sz="3456"/>
-            </a:p>
-          </p:txBody>
-        </p:sp>
-      </p:grpSp>
       <p:sp>
         <p:nvSpPr>
           <p:cNvPr id="75" name="TextBox 74">
@@ -4086,7 +4402,7 @@
         <p:spPr>
           <a:xfrm>
             <a:off x="527715" y="5082822"/>
-            <a:ext cx="4167054" cy="10802957"/>
+            <a:ext cx="4167054" cy="14742497"/>
           </a:xfrm>
           <a:prstGeom prst="rect">
             <a:avLst/>
@@ -4100,12 +4416,12 @@
           <a:lstStyle/>
           <a:p>
             <a:r>
-              <a:rPr lang="en-US" sz="2400" dirty="0"/>
+              <a:rPr lang="en-US" sz="2800" dirty="0"/>
               <a:t>This project aims to examine the role of signal processing in aiding audio classification, specifically detecting Covid-19 in cough audio files. During the pandemic, it took some time before the first accessible covid tests were released, posing a global health issue. If we were to collect data early on and use machine learning in the future, we would potentially be able to deploy these accessible tests at a much faster rate, and at significantly less cost.</a:t>
             </a:r>
           </a:p>
           <a:p>
-            <a:endParaRPr lang="en-US" sz="2400" dirty="0">
+            <a:endParaRPr lang="en-US" sz="2800" dirty="0">
               <a:solidFill>
                 <a:srgbClr val="2E2D29"/>
               </a:solidFill>
@@ -4113,18 +4429,13 @@
           </a:p>
           <a:p>
             <a:r>
-              <a:rPr lang="en-US" sz="2400" dirty="0">
+              <a:rPr lang="en-US" sz="2800" dirty="0">
                 <a:solidFill>
                   <a:srgbClr val="2E2D29"/>
                 </a:solidFill>
               </a:rPr>
               <a:t>This project compares the accuracies of different classification techniques, namely KNN, SVM, and ML, combined with different forms of signal processing on the COUGHVID dataset [1]. The types of processing used are: no processing, DFT, and MFCC. As shown in this project, adding even one layer of signal processing can boost classification accuracy.</a:t>
             </a:r>
-            <a:endParaRPr lang="en-US" sz="1600" dirty="0">
-              <a:solidFill>
-                <a:srgbClr val="2E2D29"/>
-              </a:solidFill>
-            </a:endParaRPr>
           </a:p>
         </p:txBody>
       </p:sp>
@@ -4142,7 +4453,7 @@
         </p:nvGrpSpPr>
         <p:grpSpPr>
           <a:xfrm>
-            <a:off x="26146789" y="4078081"/>
+            <a:off x="12307764" y="14374479"/>
             <a:ext cx="6459864" cy="784322"/>
             <a:chOff x="7655317" y="6043852"/>
             <a:chExt cx="9689796" cy="1176483"/>
@@ -4262,7 +4573,7 @@
         </p:nvGrpSpPr>
         <p:grpSpPr>
           <a:xfrm>
-            <a:off x="5287297" y="11375285"/>
+            <a:off x="5228090" y="10986217"/>
             <a:ext cx="6459864" cy="784322"/>
             <a:chOff x="7655317" y="6043852"/>
             <a:chExt cx="9689796" cy="1176483"/>
@@ -4382,10 +4693,10 @@
         </p:nvGrpSpPr>
         <p:grpSpPr>
           <a:xfrm>
-            <a:off x="26086615" y="9353476"/>
-            <a:ext cx="6459864" cy="784322"/>
+            <a:off x="19249777" y="15964883"/>
+            <a:ext cx="6459864" cy="784321"/>
             <a:chOff x="7655317" y="6043852"/>
-            <a:chExt cx="9689796" cy="1176483"/>
+            <a:chExt cx="9689796" cy="1176482"/>
           </a:xfrm>
         </p:grpSpPr>
         <p:sp>
@@ -4443,7 +4754,7 @@
           <p:spPr>
             <a:xfrm>
               <a:off x="7743913" y="7174616"/>
-              <a:ext cx="9601200" cy="45719"/>
+              <a:ext cx="9601200" cy="45718"/>
             </a:xfrm>
             <a:prstGeom prst="rect">
               <a:avLst/>
@@ -4502,7 +4813,7 @@
         </p:nvGrpSpPr>
         <p:grpSpPr>
           <a:xfrm>
-            <a:off x="26040174" y="14236710"/>
+            <a:off x="26086615" y="15964882"/>
             <a:ext cx="6459864" cy="784322"/>
             <a:chOff x="7655317" y="6043852"/>
             <a:chExt cx="9689796" cy="1176483"/>
@@ -4622,8 +4933,8 @@
         </p:nvSpPr>
         <p:spPr>
           <a:xfrm>
-            <a:off x="26205853" y="15301083"/>
-            <a:ext cx="845681" cy="584775"/>
+            <a:off x="26177690" y="17029255"/>
+            <a:ext cx="6184832" cy="2677656"/>
           </a:xfrm>
           <a:prstGeom prst="rect">
             <a:avLst/>
@@ -4631,14 +4942,962 @@
           <a:noFill/>
         </p:spPr>
         <p:txBody>
-          <a:bodyPr wrap="none" rtlCol="0">
+          <a:bodyPr wrap="square" rtlCol="0">
             <a:spAutoFit/>
           </a:bodyPr>
           <a:lstStyle/>
           <a:p>
             <a:r>
-              <a:rPr lang="en-US" sz="3200" dirty="0"/>
-              <a:t>Test</a:t>
+              <a:rPr lang="en-US" sz="2800" dirty="0"/>
+              <a:t>[1] </a:t>
+            </a:r>
+            <a:r>
+              <a:rPr lang="en-US" sz="2800" b="0" i="0" dirty="0" err="1">
+                <a:solidFill>
+                  <a:srgbClr val="000000"/>
+                </a:solidFill>
+                <a:effectLst/>
+              </a:rPr>
+              <a:t>Orlandic</a:t>
+            </a:r>
+            <a:r>
+              <a:rPr lang="en-US" sz="2800" b="0" i="0" dirty="0">
+                <a:solidFill>
+                  <a:srgbClr val="000000"/>
+                </a:solidFill>
+                <a:effectLst/>
+              </a:rPr>
+              <a:t>, L., </a:t>
+            </a:r>
+            <a:r>
+              <a:rPr lang="en-US" sz="2800" b="0" i="0" dirty="0" err="1">
+                <a:solidFill>
+                  <a:srgbClr val="000000"/>
+                </a:solidFill>
+                <a:effectLst/>
+              </a:rPr>
+              <a:t>Teijeiro</a:t>
+            </a:r>
+            <a:r>
+              <a:rPr lang="en-US" sz="2800" b="0" i="0" dirty="0">
+                <a:solidFill>
+                  <a:srgbClr val="000000"/>
+                </a:solidFill>
+                <a:effectLst/>
+              </a:rPr>
+              <a:t>, T. &amp; Atienza, D. The COUGHVID crowdsourcing dataset, a corpus for the study of large-scale cough analysis algorithms. *Sci Data* </a:t>
+            </a:r>
+            <a:r>
+              <a:rPr lang="en-US" sz="2800" b="1" i="0" dirty="0">
+                <a:solidFill>
+                  <a:srgbClr val="000000"/>
+                </a:solidFill>
+                <a:effectLst/>
+              </a:rPr>
+              <a:t>8,</a:t>
+            </a:r>
+            <a:r>
+              <a:rPr lang="en-US" sz="2800" b="0" i="0" dirty="0">
+                <a:solidFill>
+                  <a:srgbClr val="000000"/>
+                </a:solidFill>
+                <a:effectLst/>
+              </a:rPr>
+              <a:t> 156 (2021). </a:t>
+            </a:r>
+            <a:r>
+              <a:rPr lang="en-US" sz="2800" b="0" i="0" u="none" strike="noStrike" dirty="0">
+                <a:solidFill>
+                  <a:srgbClr val="136CB2"/>
+                </a:solidFill>
+                <a:effectLst/>
+                <a:hlinkClick r:id="rId7"/>
+              </a:rPr>
+              <a:t>https://doi.org/10.1038/s41597-021-00937-4</a:t>
+            </a:r>
+            <a:endParaRPr lang="en-US" sz="2800" dirty="0"/>
+          </a:p>
+        </p:txBody>
+      </p:sp>
+      <p:sp>
+        <p:nvSpPr>
+          <p:cNvPr id="27" name="TextBox 26">
+            <a:extLst>
+              <a:ext uri="{FF2B5EF4-FFF2-40B4-BE49-F238E27FC236}">
+                <a16:creationId xmlns:a16="http://schemas.microsoft.com/office/drawing/2014/main" id="{81658C23-60B7-8189-EB17-B0F15FDF2139}"/>
+              </a:ext>
+            </a:extLst>
+          </p:cNvPr>
+          <p:cNvSpPr txBox="1"/>
+          <p:nvPr/>
+        </p:nvSpPr>
+        <p:spPr>
+          <a:xfrm>
+            <a:off x="19416825" y="17114828"/>
+            <a:ext cx="6184832" cy="3908762"/>
+          </a:xfrm>
+          <a:prstGeom prst="rect">
+            <a:avLst/>
+          </a:prstGeom>
+          <a:noFill/>
+        </p:spPr>
+        <p:txBody>
+          <a:bodyPr wrap="square" rtlCol="0">
+            <a:spAutoFit/>
+          </a:bodyPr>
+          <a:lstStyle/>
+          <a:p>
+            <a:r>
+              <a:rPr lang="en-US" sz="2800" u="sng" dirty="0"/>
+              <a:t>Accuracy</a:t>
+            </a:r>
+          </a:p>
+          <a:p>
+            <a:pPr marL="342900" indent="-342900">
+              <a:buFont typeface="Arial" panose="020B0604020202020204" pitchFamily="34" charset="0"/>
+              <a:buChar char="•"/>
+            </a:pPr>
+            <a:r>
+              <a:rPr lang="en-US" sz="2800" dirty="0"/>
+              <a:t>Use rest of dataset</a:t>
+            </a:r>
+          </a:p>
+          <a:p>
+            <a:pPr marL="342900" indent="-342900">
+              <a:buFont typeface="Arial" panose="020B0604020202020204" pitchFamily="34" charset="0"/>
+              <a:buChar char="•"/>
+            </a:pPr>
+            <a:r>
+              <a:rPr lang="en-US" sz="2800" dirty="0"/>
+              <a:t>Combining types of processing</a:t>
+            </a:r>
+          </a:p>
+          <a:p>
+            <a:pPr marL="342900" indent="-342900">
+              <a:buFont typeface="Arial" panose="020B0604020202020204" pitchFamily="34" charset="0"/>
+              <a:buChar char="•"/>
+            </a:pPr>
+            <a:r>
+              <a:rPr lang="en-US" sz="2800" dirty="0"/>
+              <a:t>Fine-tuning of classifiers and hyperparameters</a:t>
+            </a:r>
+          </a:p>
+          <a:p>
+            <a:pPr marL="342900" indent="-342900">
+              <a:buFont typeface="Arial" panose="020B0604020202020204" pitchFamily="34" charset="0"/>
+              <a:buChar char="•"/>
+            </a:pPr>
+            <a:r>
+              <a:rPr lang="en-US" sz="2800" dirty="0"/>
+              <a:t>Different techniques (wavelets, etc.)</a:t>
+            </a:r>
+          </a:p>
+          <a:p>
+            <a:endParaRPr lang="en-US" sz="2400" dirty="0"/>
+          </a:p>
+          <a:p>
+            <a:r>
+              <a:rPr lang="en-US" sz="2800" u="sng" dirty="0"/>
+              <a:t>Other Applications</a:t>
+            </a:r>
+          </a:p>
+          <a:p>
+            <a:pPr marL="342900" indent="-342900">
+              <a:buFont typeface="Arial" panose="020B0604020202020204" pitchFamily="34" charset="0"/>
+              <a:buChar char="•"/>
+            </a:pPr>
+            <a:r>
+              <a:rPr lang="en-US" sz="2800" dirty="0"/>
+              <a:t>Flu detection</a:t>
+            </a:r>
+          </a:p>
+        </p:txBody>
+      </p:sp>
+      <p:pic>
+        <p:nvPicPr>
+          <p:cNvPr id="34" name="Picture 33">
+            <a:extLst>
+              <a:ext uri="{FF2B5EF4-FFF2-40B4-BE49-F238E27FC236}">
+                <a16:creationId xmlns:a16="http://schemas.microsoft.com/office/drawing/2014/main" id="{0B7E229B-5DEE-93C7-C559-D571E18762B3}"/>
+              </a:ext>
+            </a:extLst>
+          </p:cNvPr>
+          <p:cNvPicPr>
+            <a:picLocks noChangeAspect="1"/>
+          </p:cNvPicPr>
+          <p:nvPr/>
+        </p:nvPicPr>
+        <p:blipFill>
+          <a:blip r:embed="rId8"/>
+          <a:stretch>
+            <a:fillRect/>
+          </a:stretch>
+        </p:blipFill>
+        <p:spPr>
+          <a:xfrm>
+            <a:off x="5729545" y="17389169"/>
+            <a:ext cx="5211303" cy="3972701"/>
+          </a:xfrm>
+          <a:prstGeom prst="rect">
+            <a:avLst/>
+          </a:prstGeom>
+        </p:spPr>
+      </p:pic>
+      <p:sp>
+        <p:nvSpPr>
+          <p:cNvPr id="37" name="TextBox 36">
+            <a:extLst>
+              <a:ext uri="{FF2B5EF4-FFF2-40B4-BE49-F238E27FC236}">
+                <a16:creationId xmlns:a16="http://schemas.microsoft.com/office/drawing/2014/main" id="{3E54ABD9-070D-8F32-5862-2358B8F4DD37}"/>
+              </a:ext>
+            </a:extLst>
+          </p:cNvPr>
+          <p:cNvSpPr txBox="1"/>
+          <p:nvPr/>
+        </p:nvSpPr>
+        <p:spPr>
+          <a:xfrm>
+            <a:off x="5442896" y="5198797"/>
+            <a:ext cx="6184832" cy="461665"/>
+          </a:xfrm>
+          <a:prstGeom prst="rect">
+            <a:avLst/>
+          </a:prstGeom>
+          <a:noFill/>
+        </p:spPr>
+        <p:txBody>
+          <a:bodyPr wrap="square" rtlCol="0">
+            <a:spAutoFit/>
+          </a:bodyPr>
+          <a:lstStyle/>
+          <a:p>
+            <a:endParaRPr lang="en-US" sz="2400" dirty="0"/>
+          </a:p>
+        </p:txBody>
+      </p:sp>
+      <p:pic>
+        <p:nvPicPr>
+          <p:cNvPr id="45" name="Picture 44">
+            <a:extLst>
+              <a:ext uri="{FF2B5EF4-FFF2-40B4-BE49-F238E27FC236}">
+                <a16:creationId xmlns:a16="http://schemas.microsoft.com/office/drawing/2014/main" id="{05816323-4B7F-A8C2-03CB-35ACBE111ABD}"/>
+              </a:ext>
+            </a:extLst>
+          </p:cNvPr>
+          <p:cNvPicPr>
+            <a:picLocks noChangeAspect="1"/>
+          </p:cNvPicPr>
+          <p:nvPr/>
+        </p:nvPicPr>
+        <p:blipFill>
+          <a:blip r:embed="rId9"/>
+          <a:stretch>
+            <a:fillRect/>
+          </a:stretch>
+        </p:blipFill>
+        <p:spPr>
+          <a:xfrm>
+            <a:off x="5856050" y="6784083"/>
+            <a:ext cx="5263008" cy="3656406"/>
+          </a:xfrm>
+          <a:prstGeom prst="rect">
+            <a:avLst/>
+          </a:prstGeom>
+        </p:spPr>
+      </p:pic>
+      <p:pic>
+        <p:nvPicPr>
+          <p:cNvPr id="47" name="Picture 46">
+            <a:extLst>
+              <a:ext uri="{FF2B5EF4-FFF2-40B4-BE49-F238E27FC236}">
+                <a16:creationId xmlns:a16="http://schemas.microsoft.com/office/drawing/2014/main" id="{89920B07-EBC9-C95E-18C4-CF903D36BA63}"/>
+              </a:ext>
+            </a:extLst>
+          </p:cNvPr>
+          <p:cNvPicPr>
+            <a:picLocks noChangeAspect="1"/>
+          </p:cNvPicPr>
+          <p:nvPr/>
+        </p:nvPicPr>
+        <p:blipFill>
+          <a:blip r:embed="rId10"/>
+          <a:stretch>
+            <a:fillRect/>
+          </a:stretch>
+        </p:blipFill>
+        <p:spPr>
+          <a:xfrm>
+            <a:off x="5701113" y="13599048"/>
+            <a:ext cx="5239736" cy="3583654"/>
+          </a:xfrm>
+          <a:prstGeom prst="rect">
+            <a:avLst/>
+          </a:prstGeom>
+        </p:spPr>
+      </p:pic>
+      <p:pic>
+        <p:nvPicPr>
+          <p:cNvPr id="1028" name="Picture 4">
+            <a:extLst>
+              <a:ext uri="{FF2B5EF4-FFF2-40B4-BE49-F238E27FC236}">
+                <a16:creationId xmlns:a16="http://schemas.microsoft.com/office/drawing/2014/main" id="{E2AA8742-8E36-08C2-E25B-740F588D5230}"/>
+              </a:ext>
+            </a:extLst>
+          </p:cNvPr>
+          <p:cNvPicPr>
+            <a:picLocks noChangeAspect="1" noChangeArrowheads="1"/>
+          </p:cNvPicPr>
+          <p:nvPr/>
+        </p:nvPicPr>
+        <p:blipFill>
+          <a:blip r:embed="rId11">
+            <a:extLst>
+              <a:ext uri="{28A0092B-C50C-407E-A947-70E740481C1C}">
+                <a14:useLocalDpi xmlns:a14="http://schemas.microsoft.com/office/drawing/2010/main" val="0"/>
+              </a:ext>
+            </a:extLst>
+          </a:blip>
+          <a:srcRect/>
+          <a:stretch>
+            <a:fillRect/>
+          </a:stretch>
+        </p:blipFill>
+        <p:spPr bwMode="auto">
+          <a:xfrm>
+            <a:off x="26086615" y="6770688"/>
+            <a:ext cx="5400675" cy="4333875"/>
+          </a:xfrm>
+          <a:prstGeom prst="rect">
+            <a:avLst/>
+          </a:prstGeom>
+          <a:noFill/>
+          <a:extLst>
+            <a:ext uri="{909E8E84-426E-40DD-AFC4-6F175D3DCCD1}">
+              <a14:hiddenFill xmlns:a14="http://schemas.microsoft.com/office/drawing/2010/main">
+                <a:solidFill>
+                  <a:srgbClr val="FFFFFF"/>
+                </a:solidFill>
+              </a14:hiddenFill>
+            </a:ext>
+          </a:extLst>
+        </p:spPr>
+      </p:pic>
+      <p:pic>
+        <p:nvPicPr>
+          <p:cNvPr id="49" name="Picture 48">
+            <a:extLst>
+              <a:ext uri="{FF2B5EF4-FFF2-40B4-BE49-F238E27FC236}">
+                <a16:creationId xmlns:a16="http://schemas.microsoft.com/office/drawing/2014/main" id="{BAD8D4BA-DC4E-F927-BC07-43E6EDB10631}"/>
+              </a:ext>
+            </a:extLst>
+          </p:cNvPr>
+          <p:cNvPicPr>
+            <a:picLocks noChangeAspect="1"/>
+          </p:cNvPicPr>
+          <p:nvPr/>
+        </p:nvPicPr>
+        <p:blipFill>
+          <a:blip r:embed="rId12"/>
+          <a:stretch>
+            <a:fillRect/>
+          </a:stretch>
+        </p:blipFill>
+        <p:spPr>
+          <a:xfrm>
+            <a:off x="12382200" y="5414858"/>
+            <a:ext cx="5902970" cy="4630409"/>
+          </a:xfrm>
+          <a:prstGeom prst="rect">
+            <a:avLst/>
+          </a:prstGeom>
+        </p:spPr>
+      </p:pic>
+      <p:pic>
+        <p:nvPicPr>
+          <p:cNvPr id="51" name="Picture 50">
+            <a:extLst>
+              <a:ext uri="{FF2B5EF4-FFF2-40B4-BE49-F238E27FC236}">
+                <a16:creationId xmlns:a16="http://schemas.microsoft.com/office/drawing/2014/main" id="{00BFC1FF-0134-5442-7356-725A3A6B7C8A}"/>
+              </a:ext>
+            </a:extLst>
+          </p:cNvPr>
+          <p:cNvPicPr>
+            <a:picLocks noChangeAspect="1"/>
+          </p:cNvPicPr>
+          <p:nvPr/>
+        </p:nvPicPr>
+        <p:blipFill>
+          <a:blip r:embed="rId13"/>
+          <a:stretch>
+            <a:fillRect/>
+          </a:stretch>
+        </p:blipFill>
+        <p:spPr>
+          <a:xfrm>
+            <a:off x="12274395" y="10638396"/>
+            <a:ext cx="6045847" cy="3142536"/>
+          </a:xfrm>
+          <a:prstGeom prst="rect">
+            <a:avLst/>
+          </a:prstGeom>
+        </p:spPr>
+      </p:pic>
+      <p:pic>
+        <p:nvPicPr>
+          <p:cNvPr id="55" name="Picture 54">
+            <a:extLst>
+              <a:ext uri="{FF2B5EF4-FFF2-40B4-BE49-F238E27FC236}">
+                <a16:creationId xmlns:a16="http://schemas.microsoft.com/office/drawing/2014/main" id="{1286868A-D28A-C5BE-83BE-797C544ACC33}"/>
+              </a:ext>
+            </a:extLst>
+          </p:cNvPr>
+          <p:cNvPicPr>
+            <a:picLocks noChangeAspect="1"/>
+          </p:cNvPicPr>
+          <p:nvPr/>
+        </p:nvPicPr>
+        <p:blipFill>
+          <a:blip r:embed="rId14"/>
+          <a:stretch>
+            <a:fillRect/>
+          </a:stretch>
+        </p:blipFill>
+        <p:spPr>
+          <a:xfrm>
+            <a:off x="19952734" y="6789738"/>
+            <a:ext cx="5486400" cy="4314825"/>
+          </a:xfrm>
+          <a:prstGeom prst="rect">
+            <a:avLst/>
+          </a:prstGeom>
+        </p:spPr>
+      </p:pic>
+      <p:pic>
+        <p:nvPicPr>
+          <p:cNvPr id="57" name="Picture 56">
+            <a:extLst>
+              <a:ext uri="{FF2B5EF4-FFF2-40B4-BE49-F238E27FC236}">
+                <a16:creationId xmlns:a16="http://schemas.microsoft.com/office/drawing/2014/main" id="{BA7F9827-E166-A2F6-A2F1-F383DC685013}"/>
+              </a:ext>
+            </a:extLst>
+          </p:cNvPr>
+          <p:cNvPicPr>
+            <a:picLocks noChangeAspect="1"/>
+          </p:cNvPicPr>
+          <p:nvPr/>
+        </p:nvPicPr>
+        <p:blipFill>
+          <a:blip r:embed="rId15"/>
+          <a:stretch>
+            <a:fillRect/>
+          </a:stretch>
+        </p:blipFill>
+        <p:spPr>
+          <a:xfrm>
+            <a:off x="19507062" y="11384614"/>
+            <a:ext cx="12498937" cy="4055793"/>
+          </a:xfrm>
+          <a:prstGeom prst="rect">
+            <a:avLst/>
+          </a:prstGeom>
+        </p:spPr>
+      </p:pic>
+      <p:pic>
+        <p:nvPicPr>
+          <p:cNvPr id="65" name="Picture 64">
+            <a:extLst>
+              <a:ext uri="{FF2B5EF4-FFF2-40B4-BE49-F238E27FC236}">
+                <a16:creationId xmlns:a16="http://schemas.microsoft.com/office/drawing/2014/main" id="{CE8C0CF8-2002-DA49-F787-316DB029327B}"/>
+              </a:ext>
+            </a:extLst>
+          </p:cNvPr>
+          <p:cNvPicPr>
+            <a:picLocks noChangeAspect="1"/>
+          </p:cNvPicPr>
+          <p:nvPr/>
+        </p:nvPicPr>
+        <p:blipFill>
+          <a:blip r:embed="rId16"/>
+          <a:stretch>
+            <a:fillRect/>
+          </a:stretch>
+        </p:blipFill>
+        <p:spPr>
+          <a:xfrm>
+            <a:off x="12601931" y="17223319"/>
+            <a:ext cx="5463508" cy="4075951"/>
+          </a:xfrm>
+          <a:prstGeom prst="rect">
+            <a:avLst/>
+          </a:prstGeom>
+        </p:spPr>
+      </p:pic>
+      <p:sp>
+        <p:nvSpPr>
+          <p:cNvPr id="66" name="TextBox 65">
+            <a:extLst>
+              <a:ext uri="{FF2B5EF4-FFF2-40B4-BE49-F238E27FC236}">
+                <a16:creationId xmlns:a16="http://schemas.microsoft.com/office/drawing/2014/main" id="{9809FF8A-3AB2-AAB6-C969-45241E0A3806}"/>
+              </a:ext>
+            </a:extLst>
+          </p:cNvPr>
+          <p:cNvSpPr txBox="1"/>
+          <p:nvPr/>
+        </p:nvSpPr>
+        <p:spPr>
+          <a:xfrm>
+            <a:off x="5318585" y="5166489"/>
+            <a:ext cx="6380162" cy="1384995"/>
+          </a:xfrm>
+          <a:prstGeom prst="rect">
+            <a:avLst/>
+          </a:prstGeom>
+          <a:noFill/>
+        </p:spPr>
+        <p:txBody>
+          <a:bodyPr wrap="square" rtlCol="0">
+            <a:spAutoFit/>
+          </a:bodyPr>
+          <a:lstStyle/>
+          <a:p>
+            <a:pPr marL="457200" indent="-457200">
+              <a:buFont typeface="Arial" panose="020B0604020202020204" pitchFamily="34" charset="0"/>
+              <a:buChar char="•"/>
+            </a:pPr>
+            <a:r>
+              <a:rPr lang="en-US" sz="2800" dirty="0"/>
+              <a:t>COUGHVID dataset</a:t>
+            </a:r>
+          </a:p>
+          <a:p>
+            <a:pPr marL="457200" indent="-457200">
+              <a:buFont typeface="Arial" panose="020B0604020202020204" pitchFamily="34" charset="0"/>
+              <a:buChar char="•"/>
+            </a:pPr>
+            <a:r>
+              <a:rPr lang="en-US" sz="2800" dirty="0"/>
+              <a:t>Healthy, (symptomatic,) covid</a:t>
+            </a:r>
+          </a:p>
+          <a:p>
+            <a:pPr marL="457200" indent="-457200">
+              <a:buFont typeface="Arial" panose="020B0604020202020204" pitchFamily="34" charset="0"/>
+              <a:buChar char="•"/>
+            </a:pPr>
+            <a:r>
+              <a:rPr lang="en-US" sz="2800" dirty="0"/>
+              <a:t>Varying lengths, background noise, etc.</a:t>
+            </a:r>
+          </a:p>
+        </p:txBody>
+      </p:sp>
+      <p:grpSp>
+        <p:nvGrpSpPr>
+          <p:cNvPr id="67" name="Group 66">
+            <a:extLst>
+              <a:ext uri="{FF2B5EF4-FFF2-40B4-BE49-F238E27FC236}">
+                <a16:creationId xmlns:a16="http://schemas.microsoft.com/office/drawing/2014/main" id="{C153F33A-588B-815D-22C9-3547EE2A0BE2}"/>
+              </a:ext>
+            </a:extLst>
+          </p:cNvPr>
+          <p:cNvGrpSpPr/>
+          <p:nvPr/>
+        </p:nvGrpSpPr>
+        <p:grpSpPr>
+          <a:xfrm>
+            <a:off x="12307764" y="4064097"/>
+            <a:ext cx="6459864" cy="784322"/>
+            <a:chOff x="7655317" y="6043852"/>
+            <a:chExt cx="9689796" cy="1176483"/>
+          </a:xfrm>
+        </p:grpSpPr>
+        <p:sp>
+          <p:nvSpPr>
+            <p:cNvPr id="68" name="TextBox 67">
+              <a:extLst>
+                <a:ext uri="{FF2B5EF4-FFF2-40B4-BE49-F238E27FC236}">
+                  <a16:creationId xmlns:a16="http://schemas.microsoft.com/office/drawing/2014/main" id="{F2AAAD85-9DD9-932D-85C0-BA0DC04EDC73}"/>
+                </a:ext>
+              </a:extLst>
+            </p:cNvPr>
+            <p:cNvSpPr txBox="1"/>
+            <p:nvPr/>
+          </p:nvSpPr>
+          <p:spPr>
+            <a:xfrm>
+              <a:off x="7655317" y="6043852"/>
+              <a:ext cx="8002673" cy="969497"/>
+            </a:xfrm>
+            <a:prstGeom prst="rect">
+              <a:avLst/>
+            </a:prstGeom>
+            <a:noFill/>
+          </p:spPr>
+          <p:txBody>
+            <a:bodyPr wrap="none" rtlCol="0">
+              <a:spAutoFit/>
+            </a:bodyPr>
+            <a:lstStyle/>
+            <a:p>
+              <a:r>
+                <a:rPr lang="en-US" sz="3600" dirty="0">
+                  <a:solidFill>
+                    <a:srgbClr val="2E2D29"/>
+                  </a:solidFill>
+                  <a:latin typeface="Source Sans Pro Regular"/>
+                </a:rPr>
+                <a:t>Data Preprocessing (Cont.)</a:t>
+              </a:r>
+            </a:p>
+          </p:txBody>
+        </p:sp>
+        <p:sp>
+          <p:nvSpPr>
+            <p:cNvPr id="69" name="Rectangle 68">
+              <a:extLst>
+                <a:ext uri="{FF2B5EF4-FFF2-40B4-BE49-F238E27FC236}">
+                  <a16:creationId xmlns:a16="http://schemas.microsoft.com/office/drawing/2014/main" id="{60B8479C-F084-5FB2-22E8-BAFC98D4825A}"/>
+                </a:ext>
+              </a:extLst>
+            </p:cNvPr>
+            <p:cNvSpPr/>
+            <p:nvPr/>
+          </p:nvSpPr>
+          <p:spPr>
+            <a:xfrm>
+              <a:off x="7743913" y="7174616"/>
+              <a:ext cx="9601200" cy="45719"/>
+            </a:xfrm>
+            <a:prstGeom prst="rect">
+              <a:avLst/>
+            </a:prstGeom>
+            <a:solidFill>
+              <a:srgbClr val="8C1515"/>
+            </a:solidFill>
+            <a:ln>
+              <a:solidFill>
+                <a:srgbClr val="8C1515"/>
+              </a:solidFill>
+            </a:ln>
+          </p:spPr>
+          <p:style>
+            <a:lnRef idx="2">
+              <a:schemeClr val="accent1">
+                <a:shade val="50000"/>
+              </a:schemeClr>
+            </a:lnRef>
+            <a:fillRef idx="1">
+              <a:schemeClr val="accent1"/>
+            </a:fillRef>
+            <a:effectRef idx="0">
+              <a:schemeClr val="accent1"/>
+            </a:effectRef>
+            <a:fontRef idx="minor">
+              <a:schemeClr val="lt1"/>
+            </a:fontRef>
+          </p:style>
+          <p:txBody>
+            <a:bodyPr rot="0" spcFirstLastPara="0" vertOverflow="overflow" horzOverflow="overflow" vert="horz" wrap="square" lIns="60960" tIns="30480" rIns="60960" bIns="30480" numCol="1" spcCol="0" rtlCol="0" fromWordArt="0" anchor="ctr" anchorCtr="0" forceAA="0" compatLnSpc="1">
+              <a:prstTxWarp prst="textNoShape">
+                <a:avLst/>
+              </a:prstTxWarp>
+              <a:noAutofit/>
+            </a:bodyPr>
+            <a:lstStyle/>
+            <a:p>
+              <a:pPr algn="ctr"/>
+              <a:endParaRPr lang="en-US" sz="3456"/>
+            </a:p>
+          </p:txBody>
+        </p:sp>
+      </p:grpSp>
+      <p:grpSp>
+        <p:nvGrpSpPr>
+          <p:cNvPr id="70" name="Group 69">
+            <a:extLst>
+              <a:ext uri="{FF2B5EF4-FFF2-40B4-BE49-F238E27FC236}">
+                <a16:creationId xmlns:a16="http://schemas.microsoft.com/office/drawing/2014/main" id="{04D083D4-CDB2-4FA3-3D4C-5CD3D9E88087}"/>
+              </a:ext>
+            </a:extLst>
+          </p:cNvPr>
+          <p:cNvGrpSpPr/>
+          <p:nvPr/>
+        </p:nvGrpSpPr>
+        <p:grpSpPr>
+          <a:xfrm>
+            <a:off x="19249777" y="4060661"/>
+            <a:ext cx="13317294" cy="784322"/>
+            <a:chOff x="7655317" y="6043852"/>
+            <a:chExt cx="9689796" cy="1176483"/>
+          </a:xfrm>
+        </p:grpSpPr>
+        <p:sp>
+          <p:nvSpPr>
+            <p:cNvPr id="71" name="TextBox 70">
+              <a:extLst>
+                <a:ext uri="{FF2B5EF4-FFF2-40B4-BE49-F238E27FC236}">
+                  <a16:creationId xmlns:a16="http://schemas.microsoft.com/office/drawing/2014/main" id="{58BA4A2C-62E9-D84B-5E5C-B04467774E76}"/>
+                </a:ext>
+              </a:extLst>
+            </p:cNvPr>
+            <p:cNvSpPr txBox="1"/>
+            <p:nvPr/>
+          </p:nvSpPr>
+          <p:spPr>
+            <a:xfrm>
+              <a:off x="7655317" y="6043852"/>
+              <a:ext cx="2542900" cy="969497"/>
+            </a:xfrm>
+            <a:prstGeom prst="rect">
+              <a:avLst/>
+            </a:prstGeom>
+            <a:noFill/>
+          </p:spPr>
+          <p:txBody>
+            <a:bodyPr wrap="none" rtlCol="0">
+              <a:spAutoFit/>
+            </a:bodyPr>
+            <a:lstStyle/>
+            <a:p>
+              <a:r>
+                <a:rPr lang="en-US" sz="3600" dirty="0">
+                  <a:solidFill>
+                    <a:srgbClr val="2E2D29"/>
+                  </a:solidFill>
+                  <a:latin typeface="Source Sans Pro Regular"/>
+                </a:rPr>
+                <a:t>Results and Plots</a:t>
+              </a:r>
+            </a:p>
+          </p:txBody>
+        </p:sp>
+        <p:sp>
+          <p:nvSpPr>
+            <p:cNvPr id="72" name="Rectangle 71">
+              <a:extLst>
+                <a:ext uri="{FF2B5EF4-FFF2-40B4-BE49-F238E27FC236}">
+                  <a16:creationId xmlns:a16="http://schemas.microsoft.com/office/drawing/2014/main" id="{14E2E475-5921-24E4-CDEB-E3078CCAF820}"/>
+                </a:ext>
+              </a:extLst>
+            </p:cNvPr>
+            <p:cNvSpPr/>
+            <p:nvPr/>
+          </p:nvSpPr>
+          <p:spPr>
+            <a:xfrm>
+              <a:off x="7743913" y="7174616"/>
+              <a:ext cx="9601200" cy="45719"/>
+            </a:xfrm>
+            <a:prstGeom prst="rect">
+              <a:avLst/>
+            </a:prstGeom>
+            <a:solidFill>
+              <a:srgbClr val="8C1515"/>
+            </a:solidFill>
+            <a:ln>
+              <a:solidFill>
+                <a:srgbClr val="8C1515"/>
+              </a:solidFill>
+            </a:ln>
+          </p:spPr>
+          <p:style>
+            <a:lnRef idx="2">
+              <a:schemeClr val="accent1">
+                <a:shade val="50000"/>
+              </a:schemeClr>
+            </a:lnRef>
+            <a:fillRef idx="1">
+              <a:schemeClr val="accent1"/>
+            </a:fillRef>
+            <a:effectRef idx="0">
+              <a:schemeClr val="accent1"/>
+            </a:effectRef>
+            <a:fontRef idx="minor">
+              <a:schemeClr val="lt1"/>
+            </a:fontRef>
+          </p:style>
+          <p:txBody>
+            <a:bodyPr rot="0" spcFirstLastPara="0" vertOverflow="overflow" horzOverflow="overflow" vert="horz" wrap="square" lIns="60960" tIns="30480" rIns="60960" bIns="30480" numCol="1" spcCol="0" rtlCol="0" fromWordArt="0" anchor="ctr" anchorCtr="0" forceAA="0" compatLnSpc="1">
+              <a:prstTxWarp prst="textNoShape">
+                <a:avLst/>
+              </a:prstTxWarp>
+              <a:noAutofit/>
+            </a:bodyPr>
+            <a:lstStyle/>
+            <a:p>
+              <a:pPr algn="ctr"/>
+              <a:endParaRPr lang="en-US" sz="3456"/>
+            </a:p>
+          </p:txBody>
+        </p:sp>
+      </p:grpSp>
+      <p:sp>
+        <p:nvSpPr>
+          <p:cNvPr id="73" name="TextBox 72">
+            <a:extLst>
+              <a:ext uri="{FF2B5EF4-FFF2-40B4-BE49-F238E27FC236}">
+                <a16:creationId xmlns:a16="http://schemas.microsoft.com/office/drawing/2014/main" id="{2A4086A1-E770-0C3B-0881-40721128CC56}"/>
+              </a:ext>
+            </a:extLst>
+          </p:cNvPr>
+          <p:cNvSpPr txBox="1"/>
+          <p:nvPr/>
+        </p:nvSpPr>
+        <p:spPr>
+          <a:xfrm>
+            <a:off x="5297473" y="12081520"/>
+            <a:ext cx="6380162" cy="954107"/>
+          </a:xfrm>
+          <a:prstGeom prst="rect">
+            <a:avLst/>
+          </a:prstGeom>
+          <a:noFill/>
+        </p:spPr>
+        <p:txBody>
+          <a:bodyPr wrap="square" rtlCol="0">
+            <a:spAutoFit/>
+          </a:bodyPr>
+          <a:lstStyle/>
+          <a:p>
+            <a:pPr marL="457200" indent="-457200">
+              <a:buFont typeface="Arial" panose="020B0604020202020204" pitchFamily="34" charset="0"/>
+              <a:buChar char="•"/>
+            </a:pPr>
+            <a:r>
+              <a:rPr lang="en-US" sz="2800" dirty="0"/>
+              <a:t>Sample rate, segmentation , resizing, normalization</a:t>
+            </a:r>
+          </a:p>
+        </p:txBody>
+      </p:sp>
+      <p:sp>
+        <p:nvSpPr>
+          <p:cNvPr id="74" name="TextBox 73">
+            <a:extLst>
+              <a:ext uri="{FF2B5EF4-FFF2-40B4-BE49-F238E27FC236}">
+                <a16:creationId xmlns:a16="http://schemas.microsoft.com/office/drawing/2014/main" id="{A7971A7D-B04B-908E-DE93-02514102B811}"/>
+              </a:ext>
+            </a:extLst>
+          </p:cNvPr>
+          <p:cNvSpPr txBox="1"/>
+          <p:nvPr/>
+        </p:nvSpPr>
+        <p:spPr>
+          <a:xfrm>
+            <a:off x="12274395" y="15498755"/>
+            <a:ext cx="6380162" cy="1384995"/>
+          </a:xfrm>
+          <a:prstGeom prst="rect">
+            <a:avLst/>
+          </a:prstGeom>
+          <a:noFill/>
+        </p:spPr>
+        <p:txBody>
+          <a:bodyPr wrap="square" rtlCol="0">
+            <a:spAutoFit/>
+          </a:bodyPr>
+          <a:lstStyle/>
+          <a:p>
+            <a:pPr marL="457200" indent="-457200">
+              <a:buFont typeface="Arial" panose="020B0604020202020204" pitchFamily="34" charset="0"/>
+              <a:buChar char="•"/>
+            </a:pPr>
+            <a:r>
+              <a:rPr lang="en-US" sz="2800" dirty="0"/>
+              <a:t>In general, KNN worst, ML best</a:t>
+            </a:r>
+          </a:p>
+          <a:p>
+            <a:pPr marL="457200" indent="-457200">
+              <a:buFont typeface="Arial" panose="020B0604020202020204" pitchFamily="34" charset="0"/>
+              <a:buChar char="•"/>
+            </a:pPr>
+            <a:r>
+              <a:rPr lang="en-US" sz="2800" dirty="0"/>
+              <a:t>For KNN, 1 neighbor performed best</a:t>
+            </a:r>
+          </a:p>
+          <a:p>
+            <a:pPr marL="457200" indent="-457200">
+              <a:buFont typeface="Arial" panose="020B0604020202020204" pitchFamily="34" charset="0"/>
+              <a:buChar char="•"/>
+            </a:pPr>
+            <a:r>
+              <a:rPr lang="en-US" sz="2800" dirty="0"/>
+              <a:t>For SVM, depended on method</a:t>
+            </a:r>
+          </a:p>
+        </p:txBody>
+      </p:sp>
+      <p:sp>
+        <p:nvSpPr>
+          <p:cNvPr id="76" name="TextBox 75">
+            <a:extLst>
+              <a:ext uri="{FF2B5EF4-FFF2-40B4-BE49-F238E27FC236}">
+                <a16:creationId xmlns:a16="http://schemas.microsoft.com/office/drawing/2014/main" id="{DA4363A9-DBFE-CB4B-E605-3528D6B831F9}"/>
+              </a:ext>
+            </a:extLst>
+          </p:cNvPr>
+          <p:cNvSpPr txBox="1"/>
+          <p:nvPr/>
+        </p:nvSpPr>
+        <p:spPr>
+          <a:xfrm>
+            <a:off x="19554562" y="5120804"/>
+            <a:ext cx="12498937" cy="954107"/>
+          </a:xfrm>
+          <a:prstGeom prst="rect">
+            <a:avLst/>
+          </a:prstGeom>
+          <a:noFill/>
+        </p:spPr>
+        <p:txBody>
+          <a:bodyPr wrap="square" rtlCol="0">
+            <a:spAutoFit/>
+          </a:bodyPr>
+          <a:lstStyle/>
+          <a:p>
+            <a:pPr marL="457200" indent="-457200">
+              <a:buFont typeface="Arial" panose="020B0604020202020204" pitchFamily="34" charset="0"/>
+              <a:buChar char="•"/>
+            </a:pPr>
+            <a:r>
+              <a:rPr lang="en-US" sz="2800" dirty="0"/>
+              <a:t>NN structure: Input -&gt; Linear -&gt; </a:t>
+            </a:r>
+            <a:r>
+              <a:rPr lang="en-US" sz="2800" dirty="0" err="1"/>
+              <a:t>ReLU</a:t>
+            </a:r>
+            <a:r>
+              <a:rPr lang="en-US" sz="2800" dirty="0"/>
+              <a:t> -&gt; Linear -&gt; </a:t>
+            </a:r>
+            <a:r>
+              <a:rPr lang="en-US" sz="2800" dirty="0" err="1"/>
+              <a:t>ReLU</a:t>
+            </a:r>
+            <a:r>
+              <a:rPr lang="en-US" sz="2800" dirty="0"/>
+              <a:t> -&gt; </a:t>
+            </a:r>
+            <a:r>
+              <a:rPr lang="en-US" sz="2800" dirty="0" err="1"/>
+              <a:t>Softmax</a:t>
+            </a:r>
+            <a:r>
+              <a:rPr lang="en-US" sz="2800" dirty="0"/>
+              <a:t> -&gt; Output</a:t>
+            </a:r>
+          </a:p>
+          <a:p>
+            <a:pPr marL="457200" indent="-457200">
+              <a:buFont typeface="Arial" panose="020B0604020202020204" pitchFamily="34" charset="0"/>
+              <a:buChar char="•"/>
+            </a:pPr>
+            <a:r>
+              <a:rPr lang="en-US" sz="2800" dirty="0"/>
+              <a:t>20 epochs, batch size 4, MSE loss, Adam Optimizer (learning rate varied)</a:t>
             </a:r>
           </a:p>
         </p:txBody>
@@ -4915,4 +6174,299 @@
     </a:ext>
   </a:extLst>
 </a:theme>
+</file>
+
+<file path=ppt/theme/theme2.xml><?xml version="1.0" encoding="utf-8"?>
+<a:theme xmlns:a="http://schemas.openxmlformats.org/drawingml/2006/main" name="Office Theme">
+  <a:themeElements>
+    <a:clrScheme name="Office">
+      <a:dk1>
+        <a:sysClr val="windowText" lastClr="000000"/>
+      </a:dk1>
+      <a:lt1>
+        <a:sysClr val="window" lastClr="FFFFFF"/>
+      </a:lt1>
+      <a:dk2>
+        <a:srgbClr val="44546A"/>
+      </a:dk2>
+      <a:lt2>
+        <a:srgbClr val="E7E6E6"/>
+      </a:lt2>
+      <a:accent1>
+        <a:srgbClr val="4472C4"/>
+      </a:accent1>
+      <a:accent2>
+        <a:srgbClr val="ED7D31"/>
+      </a:accent2>
+      <a:accent3>
+        <a:srgbClr val="A5A5A5"/>
+      </a:accent3>
+      <a:accent4>
+        <a:srgbClr val="FFC000"/>
+      </a:accent4>
+      <a:accent5>
+        <a:srgbClr val="5B9BD5"/>
+      </a:accent5>
+      <a:accent6>
+        <a:srgbClr val="70AD47"/>
+      </a:accent6>
+      <a:hlink>
+        <a:srgbClr val="0563C1"/>
+      </a:hlink>
+      <a:folHlink>
+        <a:srgbClr val="954F72"/>
+      </a:folHlink>
+    </a:clrScheme>
+    <a:fontScheme name="Office">
+      <a:majorFont>
+        <a:latin typeface="Calibri Light" panose="020F0302020204030204"/>
+        <a:ea typeface=""/>
+        <a:cs typeface=""/>
+        <a:font script="Jpan" typeface="游ゴシック Light"/>
+        <a:font script="Hang" typeface="맑은 고딕"/>
+        <a:font script="Hans" typeface="等线 Light"/>
+        <a:font script="Hant" typeface="新細明體"/>
+        <a:font script="Arab" typeface="Times New Roman"/>
+        <a:font script="Hebr" typeface="Times New Roman"/>
+        <a:font script="Thai" typeface="Angsana New"/>
+        <a:font script="Ethi" typeface="Nyala"/>
+        <a:font script="Beng" typeface="Vrinda"/>
+        <a:font script="Gujr" typeface="Shruti"/>
+        <a:font script="Khmr" typeface="MoolBoran"/>
+        <a:font script="Knda" typeface="Tunga"/>
+        <a:font script="Guru" typeface="Raavi"/>
+        <a:font script="Cans" typeface="Euphemia"/>
+        <a:font script="Cher" typeface="Plantagenet Cherokee"/>
+        <a:font script="Yiii" typeface="Microsoft Yi Baiti"/>
+        <a:font script="Tibt" typeface="Microsoft Himalaya"/>
+        <a:font script="Thaa" typeface="MV Boli"/>
+        <a:font script="Deva" typeface="Mangal"/>
+        <a:font script="Telu" typeface="Gautami"/>
+        <a:font script="Taml" typeface="Latha"/>
+        <a:font script="Syrc" typeface="Estrangelo Edessa"/>
+        <a:font script="Orya" typeface="Kalinga"/>
+        <a:font script="Mlym" typeface="Kartika"/>
+        <a:font script="Laoo" typeface="DokChampa"/>
+        <a:font script="Sinh" typeface="Iskoola Pota"/>
+        <a:font script="Mong" typeface="Mongolian Baiti"/>
+        <a:font script="Viet" typeface="Times New Roman"/>
+        <a:font script="Uigh" typeface="Microsoft Uighur"/>
+        <a:font script="Geor" typeface="Sylfaen"/>
+        <a:font script="Armn" typeface="Arial"/>
+        <a:font script="Bugi" typeface="Leelawadee UI"/>
+        <a:font script="Bopo" typeface="Microsoft JhengHei"/>
+        <a:font script="Java" typeface="Javanese Text"/>
+        <a:font script="Lisu" typeface="Segoe UI"/>
+        <a:font script="Mymr" typeface="Myanmar Text"/>
+        <a:font script="Nkoo" typeface="Ebrima"/>
+        <a:font script="Olck" typeface="Nirmala UI"/>
+        <a:font script="Osma" typeface="Ebrima"/>
+        <a:font script="Phag" typeface="Phagspa"/>
+        <a:font script="Syrn" typeface="Estrangelo Edessa"/>
+        <a:font script="Syrj" typeface="Estrangelo Edessa"/>
+        <a:font script="Syre" typeface="Estrangelo Edessa"/>
+        <a:font script="Sora" typeface="Nirmala UI"/>
+        <a:font script="Tale" typeface="Microsoft Tai Le"/>
+        <a:font script="Talu" typeface="Microsoft New Tai Lue"/>
+        <a:font script="Tfng" typeface="Ebrima"/>
+      </a:majorFont>
+      <a:minorFont>
+        <a:latin typeface="Calibri" panose="020F0502020204030204"/>
+        <a:ea typeface=""/>
+        <a:cs typeface=""/>
+        <a:font script="Jpan" typeface="游ゴシック"/>
+        <a:font script="Hang" typeface="맑은 고딕"/>
+        <a:font script="Hans" typeface="等线"/>
+        <a:font script="Hant" typeface="新細明體"/>
+        <a:font script="Arab" typeface="Arial"/>
+        <a:font script="Hebr" typeface="Arial"/>
+        <a:font script="Thai" typeface="Cordia New"/>
+        <a:font script="Ethi" typeface="Nyala"/>
+        <a:font script="Beng" typeface="Vrinda"/>
+        <a:font script="Gujr" typeface="Shruti"/>
+        <a:font script="Khmr" typeface="DaunPenh"/>
+        <a:font script="Knda" typeface="Tunga"/>
+        <a:font script="Guru" typeface="Raavi"/>
+        <a:font script="Cans" typeface="Euphemia"/>
+        <a:font script="Cher" typeface="Plantagenet Cherokee"/>
+        <a:font script="Yiii" typeface="Microsoft Yi Baiti"/>
+        <a:font script="Tibt" typeface="Microsoft Himalaya"/>
+        <a:font script="Thaa" typeface="MV Boli"/>
+        <a:font script="Deva" typeface="Mangal"/>
+        <a:font script="Telu" typeface="Gautami"/>
+        <a:font script="Taml" typeface="Latha"/>
+        <a:font script="Syrc" typeface="Estrangelo Edessa"/>
+        <a:font script="Orya" typeface="Kalinga"/>
+        <a:font script="Mlym" typeface="Kartika"/>
+        <a:font script="Laoo" typeface="DokChampa"/>
+        <a:font script="Sinh" typeface="Iskoola Pota"/>
+        <a:font script="Mong" typeface="Mongolian Baiti"/>
+        <a:font script="Viet" typeface="Arial"/>
+        <a:font script="Uigh" typeface="Microsoft Uighur"/>
+        <a:font script="Geor" typeface="Sylfaen"/>
+        <a:font script="Armn" typeface="Arial"/>
+        <a:font script="Bugi" typeface="Leelawadee UI"/>
+        <a:font script="Bopo" typeface="Microsoft JhengHei"/>
+        <a:font script="Java" typeface="Javanese Text"/>
+        <a:font script="Lisu" typeface="Segoe UI"/>
+        <a:font script="Mymr" typeface="Myanmar Text"/>
+        <a:font script="Nkoo" typeface="Ebrima"/>
+        <a:font script="Olck" typeface="Nirmala UI"/>
+        <a:font script="Osma" typeface="Ebrima"/>
+        <a:font script="Phag" typeface="Phagspa"/>
+        <a:font script="Syrn" typeface="Estrangelo Edessa"/>
+        <a:font script="Syrj" typeface="Estrangelo Edessa"/>
+        <a:font script="Syre" typeface="Estrangelo Edessa"/>
+        <a:font script="Sora" typeface="Nirmala UI"/>
+        <a:font script="Tale" typeface="Microsoft Tai Le"/>
+        <a:font script="Talu" typeface="Microsoft New Tai Lue"/>
+        <a:font script="Tfng" typeface="Ebrima"/>
+      </a:minorFont>
+    </a:fontScheme>
+    <a:fmtScheme name="Office">
+      <a:fillStyleLst>
+        <a:solidFill>
+          <a:schemeClr val="phClr"/>
+        </a:solidFill>
+        <a:gradFill rotWithShape="1">
+          <a:gsLst>
+            <a:gs pos="0">
+              <a:schemeClr val="phClr">
+                <a:lumMod val="110000"/>
+                <a:satMod val="105000"/>
+                <a:tint val="67000"/>
+              </a:schemeClr>
+            </a:gs>
+            <a:gs pos="50000">
+              <a:schemeClr val="phClr">
+                <a:lumMod val="105000"/>
+                <a:satMod val="103000"/>
+                <a:tint val="73000"/>
+              </a:schemeClr>
+            </a:gs>
+            <a:gs pos="100000">
+              <a:schemeClr val="phClr">
+                <a:lumMod val="105000"/>
+                <a:satMod val="109000"/>
+                <a:tint val="81000"/>
+              </a:schemeClr>
+            </a:gs>
+          </a:gsLst>
+          <a:lin ang="5400000" scaled="0"/>
+        </a:gradFill>
+        <a:gradFill rotWithShape="1">
+          <a:gsLst>
+            <a:gs pos="0">
+              <a:schemeClr val="phClr">
+                <a:satMod val="103000"/>
+                <a:lumMod val="102000"/>
+                <a:tint val="94000"/>
+              </a:schemeClr>
+            </a:gs>
+            <a:gs pos="50000">
+              <a:schemeClr val="phClr">
+                <a:satMod val="110000"/>
+                <a:lumMod val="100000"/>
+                <a:shade val="100000"/>
+              </a:schemeClr>
+            </a:gs>
+            <a:gs pos="100000">
+              <a:schemeClr val="phClr">
+                <a:lumMod val="99000"/>
+                <a:satMod val="120000"/>
+                <a:shade val="78000"/>
+              </a:schemeClr>
+            </a:gs>
+          </a:gsLst>
+          <a:lin ang="5400000" scaled="0"/>
+        </a:gradFill>
+      </a:fillStyleLst>
+      <a:lnStyleLst>
+        <a:ln w="6350" cap="flat" cmpd="sng" algn="ctr">
+          <a:solidFill>
+            <a:schemeClr val="phClr"/>
+          </a:solidFill>
+          <a:prstDash val="solid"/>
+          <a:miter lim="800000"/>
+        </a:ln>
+        <a:ln w="12700" cap="flat" cmpd="sng" algn="ctr">
+          <a:solidFill>
+            <a:schemeClr val="phClr"/>
+          </a:solidFill>
+          <a:prstDash val="solid"/>
+          <a:miter lim="800000"/>
+        </a:ln>
+        <a:ln w="19050" cap="flat" cmpd="sng" algn="ctr">
+          <a:solidFill>
+            <a:schemeClr val="phClr"/>
+          </a:solidFill>
+          <a:prstDash val="solid"/>
+          <a:miter lim="800000"/>
+        </a:ln>
+      </a:lnStyleLst>
+      <a:effectStyleLst>
+        <a:effectStyle>
+          <a:effectLst/>
+        </a:effectStyle>
+        <a:effectStyle>
+          <a:effectLst/>
+        </a:effectStyle>
+        <a:effectStyle>
+          <a:effectLst>
+            <a:outerShdw blurRad="57150" dist="19050" dir="5400000" algn="ctr" rotWithShape="0">
+              <a:srgbClr val="000000">
+                <a:alpha val="63000"/>
+              </a:srgbClr>
+            </a:outerShdw>
+          </a:effectLst>
+        </a:effectStyle>
+      </a:effectStyleLst>
+      <a:bgFillStyleLst>
+        <a:solidFill>
+          <a:schemeClr val="phClr"/>
+        </a:solidFill>
+        <a:solidFill>
+          <a:schemeClr val="phClr">
+            <a:tint val="95000"/>
+            <a:satMod val="170000"/>
+          </a:schemeClr>
+        </a:solidFill>
+        <a:gradFill rotWithShape="1">
+          <a:gsLst>
+            <a:gs pos="0">
+              <a:schemeClr val="phClr">
+                <a:tint val="93000"/>
+                <a:satMod val="150000"/>
+                <a:shade val="98000"/>
+                <a:lumMod val="102000"/>
+              </a:schemeClr>
+            </a:gs>
+            <a:gs pos="50000">
+              <a:schemeClr val="phClr">
+                <a:tint val="98000"/>
+                <a:satMod val="130000"/>
+                <a:shade val="90000"/>
+                <a:lumMod val="103000"/>
+              </a:schemeClr>
+            </a:gs>
+            <a:gs pos="100000">
+              <a:schemeClr val="phClr">
+                <a:shade val="63000"/>
+                <a:satMod val="120000"/>
+              </a:schemeClr>
+            </a:gs>
+          </a:gsLst>
+          <a:lin ang="5400000" scaled="0"/>
+        </a:gradFill>
+      </a:bgFillStyleLst>
+    </a:fmtScheme>
+  </a:themeElements>
+  <a:objectDefaults/>
+  <a:extraClrSchemeLst/>
+  <a:extLst>
+    <a:ext uri="{05A4C25C-085E-4340-85A3-A5531E510DB2}">
+      <thm15:themeFamily xmlns:thm15="http://schemas.microsoft.com/office/thememl/2012/main" name="Office Theme" id="{62F939B6-93AF-4DB8-9C6B-D6C7DFDC589F}" vid="{4A3C46E8-61CC-4603-A589-7422A47A8E4A}"/>
+    </a:ext>
+  </a:extLst>
+</a:theme>
 </file>
</xml_diff>

<commit_message>
Adding project report files
</commit_message>
<xml_diff>
--- a/poster.pptx
+++ b/poster.pptx
@@ -197,7 +197,7 @@
           <a:p>
             <a:fld id="{7B684897-F26B-4C33-9166-03E342212020}" type="datetimeFigureOut">
               <a:rPr lang="en-US" smtClean="0"/>
-              <a:t>12/7/2023</a:t>
+              <a:t>12/12/2023</a:t>
             </a:fld>
             <a:endParaRPr lang="en-US"/>
           </a:p>
@@ -679,7 +679,7 @@
           <a:p>
             <a:fld id="{7220ECE3-515B-1A46-8D83-30082E4C106D}" type="datetimeFigureOut">
               <a:rPr lang="en-US" smtClean="0"/>
-              <a:t>12/6/2023</a:t>
+              <a:t>12/12/2023</a:t>
             </a:fld>
             <a:endParaRPr lang="en-US"/>
           </a:p>
@@ -849,7 +849,7 @@
           <a:p>
             <a:fld id="{7220ECE3-515B-1A46-8D83-30082E4C106D}" type="datetimeFigureOut">
               <a:rPr lang="en-US" smtClean="0"/>
-              <a:t>12/6/2023</a:t>
+              <a:t>12/12/2023</a:t>
             </a:fld>
             <a:endParaRPr lang="en-US"/>
           </a:p>
@@ -1029,7 +1029,7 @@
           <a:p>
             <a:fld id="{7220ECE3-515B-1A46-8D83-30082E4C106D}" type="datetimeFigureOut">
               <a:rPr lang="en-US" smtClean="0"/>
-              <a:t>12/6/2023</a:t>
+              <a:t>12/12/2023</a:t>
             </a:fld>
             <a:endParaRPr lang="en-US"/>
           </a:p>
@@ -1199,7 +1199,7 @@
           <a:p>
             <a:fld id="{7220ECE3-515B-1A46-8D83-30082E4C106D}" type="datetimeFigureOut">
               <a:rPr lang="en-US" smtClean="0"/>
-              <a:t>12/6/2023</a:t>
+              <a:t>12/12/2023</a:t>
             </a:fld>
             <a:endParaRPr lang="en-US"/>
           </a:p>
@@ -1443,7 +1443,7 @@
           <a:p>
             <a:fld id="{7220ECE3-515B-1A46-8D83-30082E4C106D}" type="datetimeFigureOut">
               <a:rPr lang="en-US" smtClean="0"/>
-              <a:t>12/6/2023</a:t>
+              <a:t>12/12/2023</a:t>
             </a:fld>
             <a:endParaRPr lang="en-US"/>
           </a:p>
@@ -1675,7 +1675,7 @@
           <a:p>
             <a:fld id="{7220ECE3-515B-1A46-8D83-30082E4C106D}" type="datetimeFigureOut">
               <a:rPr lang="en-US" smtClean="0"/>
-              <a:t>12/6/2023</a:t>
+              <a:t>12/12/2023</a:t>
             </a:fld>
             <a:endParaRPr lang="en-US"/>
           </a:p>
@@ -2042,7 +2042,7 @@
           <a:p>
             <a:fld id="{7220ECE3-515B-1A46-8D83-30082E4C106D}" type="datetimeFigureOut">
               <a:rPr lang="en-US" smtClean="0"/>
-              <a:t>12/6/2023</a:t>
+              <a:t>12/12/2023</a:t>
             </a:fld>
             <a:endParaRPr lang="en-US"/>
           </a:p>
@@ -2160,7 +2160,7 @@
           <a:p>
             <a:fld id="{7220ECE3-515B-1A46-8D83-30082E4C106D}" type="datetimeFigureOut">
               <a:rPr lang="en-US" smtClean="0"/>
-              <a:t>12/6/2023</a:t>
+              <a:t>12/12/2023</a:t>
             </a:fld>
             <a:endParaRPr lang="en-US"/>
           </a:p>
@@ -2255,7 +2255,7 @@
           <a:p>
             <a:fld id="{7220ECE3-515B-1A46-8D83-30082E4C106D}" type="datetimeFigureOut">
               <a:rPr lang="en-US" smtClean="0"/>
-              <a:t>12/6/2023</a:t>
+              <a:t>12/12/2023</a:t>
             </a:fld>
             <a:endParaRPr lang="en-US"/>
           </a:p>
@@ -2532,7 +2532,7 @@
           <a:p>
             <a:fld id="{7220ECE3-515B-1A46-8D83-30082E4C106D}" type="datetimeFigureOut">
               <a:rPr lang="en-US" smtClean="0"/>
-              <a:t>12/6/2023</a:t>
+              <a:t>12/12/2023</a:t>
             </a:fld>
             <a:endParaRPr lang="en-US"/>
           </a:p>
@@ -2789,7 +2789,7 @@
           <a:p>
             <a:fld id="{7220ECE3-515B-1A46-8D83-30082E4C106D}" type="datetimeFigureOut">
               <a:rPr lang="en-US" smtClean="0"/>
-              <a:t>12/6/2023</a:t>
+              <a:t>12/12/2023</a:t>
             </a:fld>
             <a:endParaRPr lang="en-US"/>
           </a:p>
@@ -3003,7 +3003,7 @@
             <a:fld id="{7220ECE3-515B-1A46-8D83-30082E4C106D}" type="datetimeFigureOut">
               <a:rPr lang="en-US" smtClean="0"/>
               <a:pPr/>
-              <a:t>12/6/2023</a:t>
+              <a:t>12/12/2023</a:t>
             </a:fld>
             <a:endParaRPr lang="en-US" dirty="0"/>
           </a:p>

</xml_diff>